<commit_message>
Aggiornamento presentazione quasi ultimata
</commit_message>
<xml_diff>
--- a/Quesito 2 Team/1.ISW-Metrica.pptx
+++ b/Quesito 2 Team/1.ISW-Metrica.pptx
@@ -20,6 +20,9 @@
     <p:sldId id="266" r:id="rId14"/>
     <p:sldId id="269" r:id="rId15"/>
     <p:sldId id="270" r:id="rId16"/>
+    <p:sldId id="271" r:id="rId17"/>
+    <p:sldId id="272" r:id="rId18"/>
+    <p:sldId id="273" r:id="rId19"/>
   </p:sldIdLst>
   <p:sldSz cx="9144000" cy="6858000" type="screen4x3"/>
   <p:notesSz cx="6858000" cy="9144000"/>
@@ -499,7 +502,7 @@
             <a:fld id="{E637BB6B-EE1B-48FB-8575-0D55C373DE88}" type="datetimeFigureOut">
               <a:rPr lang="en-US" smtClean="0"/>
               <a:pPr eaLnBrk="1" latinLnBrk="0" hangingPunct="1"/>
-              <a:t>14/03/16</a:t>
+              <a:t>15/03/16</a:t>
             </a:fld>
             <a:endParaRPr lang="en-US"/>
           </a:p>
@@ -647,7 +650,7 @@
             <a:fld id="{E637BB6B-EE1B-48FB-8575-0D55C373DE88}" type="datetimeFigureOut">
               <a:rPr lang="en-US" smtClean="0"/>
               <a:pPr eaLnBrk="1" latinLnBrk="0" hangingPunct="1"/>
-              <a:t>14/03/16</a:t>
+              <a:t>15/03/16</a:t>
             </a:fld>
             <a:endParaRPr lang="en-US" dirty="0"/>
           </a:p>
@@ -805,7 +808,7 @@
             <a:fld id="{E637BB6B-EE1B-48FB-8575-0D55C373DE88}" type="datetimeFigureOut">
               <a:rPr lang="en-US" smtClean="0"/>
               <a:pPr eaLnBrk="1" latinLnBrk="0" hangingPunct="1"/>
-              <a:t>14/03/16</a:t>
+              <a:t>15/03/16</a:t>
             </a:fld>
             <a:endParaRPr lang="en-US"/>
           </a:p>
@@ -957,7 +960,7 @@
             <a:fld id="{E637BB6B-EE1B-48FB-8575-0D55C373DE88}" type="datetimeFigureOut">
               <a:rPr lang="en-US" smtClean="0"/>
               <a:pPr eaLnBrk="1" latinLnBrk="0" hangingPunct="1"/>
-              <a:t>14/03/16</a:t>
+              <a:t>15/03/16</a:t>
             </a:fld>
             <a:endParaRPr lang="en-US"/>
           </a:p>
@@ -1408,7 +1411,7 @@
             <a:fld id="{E637BB6B-EE1B-48FB-8575-0D55C373DE88}" type="datetimeFigureOut">
               <a:rPr lang="en-US" smtClean="0"/>
               <a:pPr eaLnBrk="1" latinLnBrk="0" hangingPunct="1"/>
-              <a:t>14/03/16</a:t>
+              <a:t>15/03/16</a:t>
             </a:fld>
             <a:endParaRPr lang="en-US"/>
           </a:p>
@@ -1639,7 +1642,7 @@
             <a:fld id="{E637BB6B-EE1B-48FB-8575-0D55C373DE88}" type="datetimeFigureOut">
               <a:rPr lang="en-US" smtClean="0"/>
               <a:pPr eaLnBrk="1" latinLnBrk="0" hangingPunct="1"/>
-              <a:t>14/03/16</a:t>
+              <a:t>15/03/16</a:t>
             </a:fld>
             <a:endParaRPr lang="en-US"/>
           </a:p>
@@ -1974,7 +1977,7 @@
             <a:fld id="{E637BB6B-EE1B-48FB-8575-0D55C373DE88}" type="datetimeFigureOut">
               <a:rPr lang="en-US" smtClean="0"/>
               <a:pPr eaLnBrk="1" latinLnBrk="0" hangingPunct="1"/>
-              <a:t>14/03/16</a:t>
+              <a:t>15/03/16</a:t>
             </a:fld>
             <a:endParaRPr lang="en-US"/>
           </a:p>
@@ -2095,7 +2098,7 @@
             <a:fld id="{E637BB6B-EE1B-48FB-8575-0D55C373DE88}" type="datetimeFigureOut">
               <a:rPr lang="en-US" smtClean="0"/>
               <a:pPr eaLnBrk="1" latinLnBrk="0" hangingPunct="1"/>
-              <a:t>14/03/16</a:t>
+              <a:t>15/03/16</a:t>
             </a:fld>
             <a:endParaRPr lang="en-US"/>
           </a:p>
@@ -2188,7 +2191,7 @@
             <a:fld id="{E637BB6B-EE1B-48FB-8575-0D55C373DE88}" type="datetimeFigureOut">
               <a:rPr lang="en-US" smtClean="0"/>
               <a:pPr eaLnBrk="1" latinLnBrk="0" hangingPunct="1"/>
-              <a:t>14/03/16</a:t>
+              <a:t>15/03/16</a:t>
             </a:fld>
             <a:endParaRPr lang="en-US"/>
           </a:p>
@@ -2417,7 +2420,7 @@
             <a:fld id="{E637BB6B-EE1B-48FB-8575-0D55C373DE88}" type="datetimeFigureOut">
               <a:rPr lang="en-US" smtClean="0"/>
               <a:pPr eaLnBrk="1" latinLnBrk="0" hangingPunct="1"/>
-              <a:t>14/03/16</a:t>
+              <a:t>15/03/16</a:t>
             </a:fld>
             <a:endParaRPr lang="en-US"/>
           </a:p>
@@ -2668,7 +2671,7 @@
             <a:fld id="{E637BB6B-EE1B-48FB-8575-0D55C373DE88}" type="datetimeFigureOut">
               <a:rPr lang="en-US" smtClean="0"/>
               <a:pPr eaLnBrk="1" latinLnBrk="0" hangingPunct="1"/>
-              <a:t>14/03/16</a:t>
+              <a:t>15/03/16</a:t>
             </a:fld>
             <a:endParaRPr lang="en-US"/>
           </a:p>
@@ -3075,7 +3078,7 @@
             <a:fld id="{E637BB6B-EE1B-48FB-8575-0D55C373DE88}" type="datetimeFigureOut">
               <a:rPr lang="en-US" smtClean="0"/>
               <a:pPr eaLnBrk="1" latinLnBrk="0" hangingPunct="1"/>
-              <a:t>14/03/16</a:t>
+              <a:t>15/03/16</a:t>
             </a:fld>
             <a:endParaRPr lang="en-US" sz="1000">
               <a:solidFill>
@@ -3604,12 +3607,12 @@
         <p:spPr>
           <a:xfrm>
             <a:off x="457200" y="274638"/>
-            <a:ext cx="8312484" cy="6249151"/>
+            <a:ext cx="8312484" cy="4270625"/>
           </a:xfrm>
         </p:spPr>
         <p:txBody>
           <a:bodyPr>
-            <a:normAutofit fontScale="92500" lnSpcReduction="20000"/>
+            <a:normAutofit/>
           </a:bodyPr>
           <a:lstStyle/>
           <a:p>
@@ -3619,7 +3622,31 @@
             </a:r>
             <a:r>
               <a:rPr lang="it-IT" dirty="0"/>
-              <a:t>possibile metrica è la modularità, in quanto consente di suddividere un progetto software in un insieme di moduli (divide et impera). </a:t>
+              <a:t>possibile metrica è la </a:t>
+            </a:r>
+            <a:r>
+              <a:rPr lang="it-IT" b="1" dirty="0">
+                <a:solidFill>
+                  <a:srgbClr val="FF0000"/>
+                </a:solidFill>
+              </a:rPr>
+              <a:t>modularità</a:t>
+            </a:r>
+            <a:r>
+              <a:rPr lang="it-IT" dirty="0"/>
+              <a:t>, in quanto consente di suddividere un progetto software in un insieme di moduli (</a:t>
+            </a:r>
+            <a:r>
+              <a:rPr lang="it-IT" dirty="0">
+                <a:solidFill>
+                  <a:srgbClr val="FFFF00"/>
+                </a:solidFill>
+              </a:rPr>
+              <a:t>divide et impera</a:t>
+            </a:r>
+            <a:r>
+              <a:rPr lang="it-IT" dirty="0"/>
+              <a:t>). </a:t>
             </a:r>
             <a:endParaRPr lang="it-IT" dirty="0" smtClean="0"/>
           </a:p>
@@ -3669,16 +3696,6 @@
             <a:pPr marL="36576" indent="0">
               <a:buNone/>
             </a:pPr>
-            <a:r>
-              <a:rPr lang="it-IT" dirty="0" smtClean="0"/>
-              <a:t>Il </a:t>
-            </a:r>
-            <a:r>
-              <a:rPr lang="it-IT" dirty="0"/>
-              <a:t>deficit della modularità è dato dal fatto che a volte, visto che i diversi moduli possono essere sviluppati da programmatori diversi, è possibile che si verifichino errori dovuti alla  scarsa comunicazione tra i componenti del team.</a:t>
-            </a:r>
-          </a:p>
-          <a:p>
             <a:endParaRPr lang="en-US" dirty="0"/>
           </a:p>
         </p:txBody>
@@ -3705,7 +3722,7 @@
         </p:blipFill>
         <p:spPr>
           <a:xfrm>
-            <a:off x="1309057" y="1943099"/>
+            <a:off x="1309057" y="2260007"/>
             <a:ext cx="6615743" cy="2161005"/>
           </a:xfrm>
           <a:prstGeom prst="rect">
@@ -3713,6 +3730,46 @@
           </a:prstGeom>
         </p:spPr>
       </p:pic>
+      <p:sp>
+        <p:nvSpPr>
+          <p:cNvPr id="2" name="TextBox 1"/>
+          <p:cNvSpPr txBox="1"/>
+          <p:nvPr/>
+        </p:nvSpPr>
+        <p:spPr>
+          <a:xfrm>
+            <a:off x="457200" y="4421012"/>
+            <a:ext cx="8312485" cy="2677656"/>
+          </a:xfrm>
+          <a:prstGeom prst="rect">
+            <a:avLst/>
+          </a:prstGeom>
+          <a:noFill/>
+        </p:spPr>
+        <p:txBody>
+          <a:bodyPr wrap="square" rtlCol="0">
+            <a:spAutoFit/>
+          </a:bodyPr>
+          <a:lstStyle/>
+          <a:p>
+            <a:r>
+              <a:rPr lang="it-IT" sz="3000" dirty="0"/>
+              <a:t>Il deficit della modularità è dato dal fatto che a volte, visto che i diversi moduli possono essere sviluppati da programmatori diversi, è possibile che si verifichino </a:t>
+            </a:r>
+            <a:r>
+              <a:rPr lang="it-IT" sz="3000" b="1" i="1" u="sng" dirty="0"/>
+              <a:t>errori dovuti alla  scarsa comunicazione</a:t>
+            </a:r>
+            <a:r>
+              <a:rPr lang="it-IT" sz="3000" dirty="0"/>
+              <a:t> tra i componenti del team.</a:t>
+            </a:r>
+          </a:p>
+          <a:p>
+            <a:endParaRPr lang="en-US" dirty="0"/>
+          </a:p>
+        </p:txBody>
+      </p:sp>
     </p:spTree>
     <p:extLst>
       <p:ext uri="{BB962C8B-B14F-4D97-AF65-F5344CB8AC3E}">
@@ -3726,9 +3783,333 @@
   <p:timing>
     <p:tnLst>
       <p:par>
-        <p:cTn xmlns:p14="http://schemas.microsoft.com/office/powerpoint/2010/main" id="1" dur="indefinite" restart="never" nodeType="tmRoot"/>
+        <p:cTn xmlns:p14="http://schemas.microsoft.com/office/powerpoint/2010/main" id="1" dur="indefinite" restart="never" nodeType="tmRoot">
+          <p:childTnLst>
+            <p:seq concurrent="1" nextAc="seek">
+              <p:cTn id="2" dur="indefinite" nodeType="mainSeq">
+                <p:childTnLst>
+                  <p:par>
+                    <p:cTn id="3" fill="hold">
+                      <p:stCondLst>
+                        <p:cond delay="indefinite"/>
+                      </p:stCondLst>
+                      <p:childTnLst>
+                        <p:par>
+                          <p:cTn id="4" fill="hold">
+                            <p:stCondLst>
+                              <p:cond delay="0"/>
+                            </p:stCondLst>
+                            <p:childTnLst>
+                              <p:par>
+                                <p:cTn id="5" presetID="35" presetClass="entr" presetSubtype="0" fill="hold" nodeType="clickEffect">
+                                  <p:stCondLst>
+                                    <p:cond delay="0"/>
+                                  </p:stCondLst>
+                                  <p:childTnLst>
+                                    <p:set>
+                                      <p:cBhvr>
+                                        <p:cTn id="6" dur="1" fill="hold">
+                                          <p:stCondLst>
+                                            <p:cond delay="0"/>
+                                          </p:stCondLst>
+                                        </p:cTn>
+                                        <p:tgtEl>
+                                          <p:spTgt spid="4"/>
+                                        </p:tgtEl>
+                                        <p:attrNameLst>
+                                          <p:attrName>style.visibility</p:attrName>
+                                        </p:attrNameLst>
+                                      </p:cBhvr>
+                                      <p:to>
+                                        <p:strVal val="visible"/>
+                                      </p:to>
+                                    </p:set>
+                                    <p:animEffect transition="in" filter="fade">
+                                      <p:cBhvr>
+                                        <p:cTn id="7" dur="700"/>
+                                        <p:tgtEl>
+                                          <p:spTgt spid="4"/>
+                                        </p:tgtEl>
+                                      </p:cBhvr>
+                                    </p:animEffect>
+                                    <p:anim calcmode="lin" valueType="num">
+                                      <p:cBhvr>
+                                        <p:cTn id="8" dur="700" fill="hold"/>
+                                        <p:tgtEl>
+                                          <p:spTgt spid="4"/>
+                                        </p:tgtEl>
+                                        <p:attrNameLst>
+                                          <p:attrName>style.rotation</p:attrName>
+                                        </p:attrNameLst>
+                                      </p:cBhvr>
+                                      <p:tavLst>
+                                        <p:tav tm="0">
+                                          <p:val>
+                                            <p:fltVal val="720"/>
+                                          </p:val>
+                                        </p:tav>
+                                        <p:tav tm="100000">
+                                          <p:val>
+                                            <p:fltVal val="0"/>
+                                          </p:val>
+                                        </p:tav>
+                                      </p:tavLst>
+                                    </p:anim>
+                                    <p:anim calcmode="lin" valueType="num">
+                                      <p:cBhvr>
+                                        <p:cTn id="9" dur="700" fill="hold"/>
+                                        <p:tgtEl>
+                                          <p:spTgt spid="4"/>
+                                        </p:tgtEl>
+                                        <p:attrNameLst>
+                                          <p:attrName>ppt_h</p:attrName>
+                                        </p:attrNameLst>
+                                      </p:cBhvr>
+                                      <p:tavLst>
+                                        <p:tav tm="0">
+                                          <p:val>
+                                            <p:fltVal val="0"/>
+                                          </p:val>
+                                        </p:tav>
+                                        <p:tav tm="100000">
+                                          <p:val>
+                                            <p:strVal val="#ppt_h"/>
+                                          </p:val>
+                                        </p:tav>
+                                      </p:tavLst>
+                                    </p:anim>
+                                    <p:anim calcmode="lin" valueType="num">
+                                      <p:cBhvr>
+                                        <p:cTn id="10" dur="700" fill="hold"/>
+                                        <p:tgtEl>
+                                          <p:spTgt spid="4"/>
+                                        </p:tgtEl>
+                                        <p:attrNameLst>
+                                          <p:attrName>ppt_w</p:attrName>
+                                        </p:attrNameLst>
+                                      </p:cBhvr>
+                                      <p:tavLst>
+                                        <p:tav tm="0">
+                                          <p:val>
+                                            <p:fltVal val="0"/>
+                                          </p:val>
+                                        </p:tav>
+                                        <p:tav tm="100000">
+                                          <p:val>
+                                            <p:strVal val="#ppt_w"/>
+                                          </p:val>
+                                        </p:tav>
+                                      </p:tavLst>
+                                    </p:anim>
+                                  </p:childTnLst>
+                                </p:cTn>
+                              </p:par>
+                            </p:childTnLst>
+                          </p:cTn>
+                        </p:par>
+                      </p:childTnLst>
+                    </p:cTn>
+                  </p:par>
+                  <p:par>
+                    <p:cTn id="11" fill="hold">
+                      <p:stCondLst>
+                        <p:cond delay="indefinite"/>
+                      </p:stCondLst>
+                      <p:childTnLst>
+                        <p:par>
+                          <p:cTn id="12" fill="hold">
+                            <p:stCondLst>
+                              <p:cond delay="0"/>
+                            </p:stCondLst>
+                            <p:childTnLst>
+                              <p:par>
+                                <p:cTn id="13" presetID="30" presetClass="entr" presetSubtype="0" fill="hold" grpId="0" nodeType="clickEffect">
+                                  <p:stCondLst>
+                                    <p:cond delay="0"/>
+                                  </p:stCondLst>
+                                  <p:childTnLst>
+                                    <p:set>
+                                      <p:cBhvr>
+                                        <p:cTn id="14" dur="1" fill="hold">
+                                          <p:stCondLst>
+                                            <p:cond delay="0"/>
+                                          </p:stCondLst>
+                                        </p:cTn>
+                                        <p:tgtEl>
+                                          <p:spTgt spid="2"/>
+                                        </p:tgtEl>
+                                        <p:attrNameLst>
+                                          <p:attrName>style.visibility</p:attrName>
+                                        </p:attrNameLst>
+                                      </p:cBhvr>
+                                      <p:to>
+                                        <p:strVal val="visible"/>
+                                      </p:to>
+                                    </p:set>
+                                    <p:animEffect transition="in" filter="fade">
+                                      <p:cBhvr>
+                                        <p:cTn id="15" dur="800" decel="100000"/>
+                                        <p:tgtEl>
+                                          <p:spTgt spid="2"/>
+                                        </p:tgtEl>
+                                      </p:cBhvr>
+                                    </p:animEffect>
+                                    <p:anim calcmode="lin" valueType="num">
+                                      <p:cBhvr>
+                                        <p:cTn id="16" dur="800" decel="100000" fill="hold"/>
+                                        <p:tgtEl>
+                                          <p:spTgt spid="2"/>
+                                        </p:tgtEl>
+                                        <p:attrNameLst>
+                                          <p:attrName>style.rotation</p:attrName>
+                                        </p:attrNameLst>
+                                      </p:cBhvr>
+                                      <p:tavLst>
+                                        <p:tav tm="0">
+                                          <p:val>
+                                            <p:fltVal val="-90"/>
+                                          </p:val>
+                                        </p:tav>
+                                        <p:tav tm="100000">
+                                          <p:val>
+                                            <p:fltVal val="0"/>
+                                          </p:val>
+                                        </p:tav>
+                                      </p:tavLst>
+                                    </p:anim>
+                                    <p:anim calcmode="lin" valueType="num">
+                                      <p:cBhvr>
+                                        <p:cTn id="17" dur="800" decel="100000" fill="hold"/>
+                                        <p:tgtEl>
+                                          <p:spTgt spid="2"/>
+                                        </p:tgtEl>
+                                        <p:attrNameLst>
+                                          <p:attrName>ppt_x</p:attrName>
+                                        </p:attrNameLst>
+                                      </p:cBhvr>
+                                      <p:tavLst>
+                                        <p:tav tm="0">
+                                          <p:val>
+                                            <p:strVal val="#ppt_x+0.4"/>
+                                          </p:val>
+                                        </p:tav>
+                                        <p:tav tm="100000">
+                                          <p:val>
+                                            <p:strVal val="#ppt_x-0.05"/>
+                                          </p:val>
+                                        </p:tav>
+                                      </p:tavLst>
+                                    </p:anim>
+                                    <p:anim calcmode="lin" valueType="num">
+                                      <p:cBhvr>
+                                        <p:cTn id="18" dur="800" decel="100000" fill="hold"/>
+                                        <p:tgtEl>
+                                          <p:spTgt spid="2"/>
+                                        </p:tgtEl>
+                                        <p:attrNameLst>
+                                          <p:attrName>ppt_y</p:attrName>
+                                        </p:attrNameLst>
+                                      </p:cBhvr>
+                                      <p:tavLst>
+                                        <p:tav tm="0">
+                                          <p:val>
+                                            <p:strVal val="#ppt_y-0.4"/>
+                                          </p:val>
+                                        </p:tav>
+                                        <p:tav tm="100000">
+                                          <p:val>
+                                            <p:strVal val="#ppt_y+0.1"/>
+                                          </p:val>
+                                        </p:tav>
+                                      </p:tavLst>
+                                    </p:anim>
+                                    <p:anim calcmode="lin" valueType="num">
+                                      <p:cBhvr>
+                                        <p:cTn id="19" dur="200" accel="100000" fill="hold">
+                                          <p:stCondLst>
+                                            <p:cond delay="800"/>
+                                          </p:stCondLst>
+                                        </p:cTn>
+                                        <p:tgtEl>
+                                          <p:spTgt spid="2"/>
+                                        </p:tgtEl>
+                                        <p:attrNameLst>
+                                          <p:attrName>ppt_x</p:attrName>
+                                        </p:attrNameLst>
+                                      </p:cBhvr>
+                                      <p:tavLst>
+                                        <p:tav tm="0">
+                                          <p:val>
+                                            <p:strVal val="#ppt_x-0.05"/>
+                                          </p:val>
+                                        </p:tav>
+                                        <p:tav tm="100000">
+                                          <p:val>
+                                            <p:strVal val="#ppt_x"/>
+                                          </p:val>
+                                        </p:tav>
+                                      </p:tavLst>
+                                    </p:anim>
+                                    <p:anim calcmode="lin" valueType="num">
+                                      <p:cBhvr>
+                                        <p:cTn id="20" dur="200" accel="100000" fill="hold">
+                                          <p:stCondLst>
+                                            <p:cond delay="800"/>
+                                          </p:stCondLst>
+                                        </p:cTn>
+                                        <p:tgtEl>
+                                          <p:spTgt spid="2"/>
+                                        </p:tgtEl>
+                                        <p:attrNameLst>
+                                          <p:attrName>ppt_y</p:attrName>
+                                        </p:attrNameLst>
+                                      </p:cBhvr>
+                                      <p:tavLst>
+                                        <p:tav tm="0">
+                                          <p:val>
+                                            <p:strVal val="#ppt_y+0.1"/>
+                                          </p:val>
+                                        </p:tav>
+                                        <p:tav tm="100000">
+                                          <p:val>
+                                            <p:strVal val="#ppt_y"/>
+                                          </p:val>
+                                        </p:tav>
+                                      </p:tavLst>
+                                    </p:anim>
+                                  </p:childTnLst>
+                                </p:cTn>
+                              </p:par>
+                            </p:childTnLst>
+                          </p:cTn>
+                        </p:par>
+                      </p:childTnLst>
+                    </p:cTn>
+                  </p:par>
+                </p:childTnLst>
+              </p:cTn>
+              <p:prevCondLst>
+                <p:cond evt="onPrev" delay="0">
+                  <p:tgtEl>
+                    <p:sldTgt/>
+                  </p:tgtEl>
+                </p:cond>
+              </p:prevCondLst>
+              <p:nextCondLst>
+                <p:cond evt="onNext" delay="0">
+                  <p:tgtEl>
+                    <p:sldTgt/>
+                  </p:tgtEl>
+                </p:cond>
+              </p:nextCondLst>
+            </p:seq>
+          </p:childTnLst>
+        </p:cTn>
       </p:par>
     </p:tnLst>
+    <p:bldLst>
+      <p:bldP spid="2" grpId="0"/>
+    </p:bldLst>
   </p:timing>
 </p:sld>
 </file>
@@ -3783,7 +4164,7 @@
               <a:t>altra metrica è rappresentata dalla </a:t>
             </a:r>
             <a:r>
-              <a:rPr lang="it-IT" dirty="0">
+              <a:rPr lang="it-IT" b="1" dirty="0">
                 <a:solidFill>
                   <a:srgbClr val="FF0000"/>
                 </a:solidFill>
@@ -3791,7 +4172,7 @@
               <a:t>velocità di completamento di </a:t>
             </a:r>
             <a:r>
-              <a:rPr lang="it-IT" dirty="0" smtClean="0">
+              <a:rPr lang="it-IT" b="1" dirty="0" smtClean="0">
                 <a:solidFill>
                   <a:srgbClr val="FF0000"/>
                 </a:solidFill>
@@ -4407,11 +4788,7 @@
             </a:pPr>
             <a:r>
               <a:rPr lang="it-IT" dirty="0"/>
-              <a:t>Un errore o bacco (in inglese bug) rappresenta un "difetto" che si ha nell'esecuzione di un programma o di un prodotto software, quando, per certi tipi di dati in ingresso, si ha un funzionamento diverso da quello voluto.</a:t>
-            </a:r>
-            <a:r>
-              <a:rPr lang="it-IT" dirty="0"/>
-              <a:t> </a:t>
+              <a:t>Un errore o bacco (in inglese bug) rappresenta un "difetto" che si ha nell'esecuzione di un programma o di un prodotto software, quando, per certi tipi di dati in ingresso, si ha un funzionamento diverso da quello voluto. </a:t>
             </a:r>
             <a:endParaRPr lang="it-IT" dirty="0" smtClean="0"/>
           </a:p>
@@ -4701,6 +5078,893 @@
   <p:clrMapOvr>
     <a:masterClrMapping/>
   </p:clrMapOvr>
+  <p:timing>
+    <p:tnLst>
+      <p:par>
+        <p:cTn xmlns:p14="http://schemas.microsoft.com/office/powerpoint/2010/main" id="1" dur="indefinite" restart="never" nodeType="tmRoot"/>
+      </p:par>
+    </p:tnLst>
+  </p:timing>
+</p:sld>
+</file>
+
+<file path=ppt/slides/slide16.xml><?xml version="1.0" encoding="utf-8"?>
+<p:sld xmlns:a="http://schemas.openxmlformats.org/drawingml/2006/main" xmlns:r="http://schemas.openxmlformats.org/officeDocument/2006/relationships" xmlns:p="http://schemas.openxmlformats.org/presentationml/2006/main">
+  <p:cSld>
+    <p:spTree>
+      <p:nvGrpSpPr>
+        <p:cNvPr id="1" name=""/>
+        <p:cNvGrpSpPr/>
+        <p:nvPr/>
+      </p:nvGrpSpPr>
+      <p:grpSpPr>
+        <a:xfrm>
+          <a:off x="0" y="0"/>
+          <a:ext cx="0" cy="0"/>
+          <a:chOff x="0" y="0"/>
+          <a:chExt cx="0" cy="0"/>
+        </a:xfrm>
+      </p:grpSpPr>
+      <p:sp>
+        <p:nvSpPr>
+          <p:cNvPr id="9" name="TextBox 8"/>
+          <p:cNvSpPr txBox="1"/>
+          <p:nvPr/>
+        </p:nvSpPr>
+        <p:spPr>
+          <a:xfrm>
+            <a:off x="248602" y="313120"/>
+            <a:ext cx="8614124" cy="1015663"/>
+          </a:xfrm>
+          <a:prstGeom prst="rect">
+            <a:avLst/>
+          </a:prstGeom>
+          <a:noFill/>
+        </p:spPr>
+        <p:txBody>
+          <a:bodyPr wrap="square" rtlCol="0">
+            <a:spAutoFit/>
+          </a:bodyPr>
+          <a:lstStyle/>
+          <a:p>
+            <a:r>
+              <a:rPr lang="en-US" sz="3000" dirty="0" smtClean="0">
+                <a:solidFill>
+                  <a:srgbClr val="FF0000"/>
+                </a:solidFill>
+              </a:rPr>
+              <a:t>L’ISW </a:t>
+            </a:r>
+            <a:r>
+              <a:rPr lang="en-US" sz="3000" dirty="0" err="1" smtClean="0">
+                <a:solidFill>
+                  <a:srgbClr val="FF0000"/>
+                </a:solidFill>
+              </a:rPr>
+              <a:t>è</a:t>
+            </a:r>
+            <a:r>
+              <a:rPr lang="en-US" sz="3000" dirty="0" smtClean="0">
+                <a:solidFill>
+                  <a:srgbClr val="FF0000"/>
+                </a:solidFill>
+              </a:rPr>
+              <a:t> </a:t>
+            </a:r>
+            <a:r>
+              <a:rPr lang="en-US" sz="3000" dirty="0" err="1" smtClean="0">
+                <a:solidFill>
+                  <a:srgbClr val="FF0000"/>
+                </a:solidFill>
+              </a:rPr>
+              <a:t>considerabile</a:t>
+            </a:r>
+            <a:r>
+              <a:rPr lang="en-US" sz="3000" dirty="0" smtClean="0">
+                <a:solidFill>
+                  <a:srgbClr val="FF0000"/>
+                </a:solidFill>
+              </a:rPr>
+              <a:t> </a:t>
+            </a:r>
+            <a:r>
+              <a:rPr lang="en-US" sz="3000" dirty="0" err="1" smtClean="0">
+                <a:solidFill>
+                  <a:srgbClr val="FF0000"/>
+                </a:solidFill>
+              </a:rPr>
+              <a:t>una</a:t>
+            </a:r>
+            <a:r>
+              <a:rPr lang="en-US" sz="3000" dirty="0" smtClean="0">
+                <a:solidFill>
+                  <a:srgbClr val="FF0000"/>
+                </a:solidFill>
+              </a:rPr>
+              <a:t> </a:t>
+            </a:r>
+            <a:r>
+              <a:rPr lang="en-US" sz="3000" dirty="0" err="1" smtClean="0">
+                <a:solidFill>
+                  <a:srgbClr val="FF0000"/>
+                </a:solidFill>
+              </a:rPr>
+              <a:t>disciplina</a:t>
+            </a:r>
+            <a:r>
+              <a:rPr lang="en-US" sz="3000" dirty="0" smtClean="0">
+                <a:solidFill>
+                  <a:srgbClr val="FF0000"/>
+                </a:solidFill>
+              </a:rPr>
+              <a:t> </a:t>
+            </a:r>
+            <a:r>
+              <a:rPr lang="en-US" sz="3000" dirty="0" err="1" smtClean="0">
+                <a:solidFill>
+                  <a:srgbClr val="FF0000"/>
+                </a:solidFill>
+              </a:rPr>
+              <a:t>scientifica</a:t>
+            </a:r>
+            <a:r>
+              <a:rPr lang="en-US" sz="3000" dirty="0" smtClean="0">
+                <a:solidFill>
+                  <a:srgbClr val="FF0000"/>
+                </a:solidFill>
+              </a:rPr>
+              <a:t> </a:t>
+            </a:r>
+            <a:r>
+              <a:rPr lang="en-US" sz="3000" dirty="0" err="1" smtClean="0">
+                <a:solidFill>
+                  <a:srgbClr val="FF0000"/>
+                </a:solidFill>
+              </a:rPr>
+              <a:t>esatta</a:t>
+            </a:r>
+            <a:r>
+              <a:rPr lang="en-US" sz="3000" dirty="0" smtClean="0">
+                <a:solidFill>
+                  <a:srgbClr val="FF0000"/>
+                </a:solidFill>
+              </a:rPr>
+              <a:t>?</a:t>
+            </a:r>
+            <a:endParaRPr lang="en-US" sz="3000" dirty="0">
+              <a:solidFill>
+                <a:srgbClr val="FF0000"/>
+              </a:solidFill>
+            </a:endParaRPr>
+          </a:p>
+        </p:txBody>
+      </p:sp>
+      <p:sp>
+        <p:nvSpPr>
+          <p:cNvPr id="11" name="TextBox 10"/>
+          <p:cNvSpPr txBox="1"/>
+          <p:nvPr/>
+        </p:nvSpPr>
+        <p:spPr>
+          <a:xfrm>
+            <a:off x="248602" y="4854675"/>
+            <a:ext cx="8614124" cy="1754327"/>
+          </a:xfrm>
+          <a:prstGeom prst="rect">
+            <a:avLst/>
+          </a:prstGeom>
+          <a:noFill/>
+        </p:spPr>
+        <p:txBody>
+          <a:bodyPr wrap="square" rtlCol="0">
+            <a:spAutoFit/>
+          </a:bodyPr>
+          <a:lstStyle/>
+          <a:p>
+            <a:r>
+              <a:rPr lang="it-IT" sz="3000" dirty="0"/>
+              <a:t>vi sono </a:t>
+            </a:r>
+            <a:r>
+              <a:rPr lang="it-IT" sz="3000" dirty="0" smtClean="0"/>
+              <a:t>discipline </a:t>
+            </a:r>
+            <a:r>
+              <a:rPr lang="it-IT" sz="3000" dirty="0"/>
+              <a:t>che stanno ancora cercando di stabilire il proprio fondamento </a:t>
+            </a:r>
+            <a:r>
+              <a:rPr lang="it-IT" sz="3000" dirty="0" smtClean="0"/>
+              <a:t>scientifico (</a:t>
+            </a:r>
+            <a:r>
+              <a:rPr lang="it-IT" sz="3000" dirty="0" smtClean="0">
+                <a:solidFill>
+                  <a:srgbClr val="FFFF00"/>
+                </a:solidFill>
+              </a:rPr>
+              <a:t>discipline empiriche</a:t>
+            </a:r>
+            <a:r>
+              <a:rPr lang="it-IT" sz="3000" dirty="0" smtClean="0"/>
+              <a:t>).</a:t>
+            </a:r>
+            <a:endParaRPr lang="it-IT" sz="3000" dirty="0"/>
+          </a:p>
+          <a:p>
+            <a:endParaRPr lang="en-US" dirty="0"/>
+          </a:p>
+        </p:txBody>
+      </p:sp>
+      <p:pic>
+        <p:nvPicPr>
+          <p:cNvPr id="12" name="Picture 11" descr="Senza-titolo-4.jpg"/>
+          <p:cNvPicPr>
+            <a:picLocks noChangeAspect="1"/>
+          </p:cNvPicPr>
+          <p:nvPr/>
+        </p:nvPicPr>
+        <p:blipFill>
+          <a:blip r:embed="rId2">
+            <a:extLst>
+              <a:ext uri="{28A0092B-C50C-407E-A947-70E740481C1C}">
+                <a14:useLocalDpi xmlns:a14="http://schemas.microsoft.com/office/drawing/2010/main" val="0"/>
+              </a:ext>
+            </a:extLst>
+          </a:blip>
+          <a:stretch>
+            <a:fillRect/>
+          </a:stretch>
+        </p:blipFill>
+        <p:spPr>
+          <a:xfrm>
+            <a:off x="2084440" y="1494451"/>
+            <a:ext cx="4974742" cy="2978607"/>
+          </a:xfrm>
+          <a:prstGeom prst="rect">
+            <a:avLst/>
+          </a:prstGeom>
+        </p:spPr>
+      </p:pic>
+    </p:spTree>
+    <p:extLst>
+      <p:ext uri="{BB962C8B-B14F-4D97-AF65-F5344CB8AC3E}">
+        <p14:creationId xmlns:p14="http://schemas.microsoft.com/office/powerpoint/2010/main" val="406651820"/>
+      </p:ext>
+    </p:extLst>
+  </p:cSld>
+  <p:clrMapOvr>
+    <a:masterClrMapping/>
+  </p:clrMapOvr>
+  <p:timing>
+    <p:tnLst>
+      <p:par>
+        <p:cTn xmlns:p14="http://schemas.microsoft.com/office/powerpoint/2010/main" id="1" dur="indefinite" restart="never" nodeType="tmRoot"/>
+      </p:par>
+    </p:tnLst>
+  </p:timing>
+</p:sld>
+</file>
+
+<file path=ppt/slides/slide17.xml><?xml version="1.0" encoding="utf-8"?>
+<p:sld xmlns:a="http://schemas.openxmlformats.org/drawingml/2006/main" xmlns:r="http://schemas.openxmlformats.org/officeDocument/2006/relationships" xmlns:p="http://schemas.openxmlformats.org/presentationml/2006/main">
+  <p:cSld>
+    <p:spTree>
+      <p:nvGrpSpPr>
+        <p:cNvPr id="1" name=""/>
+        <p:cNvGrpSpPr/>
+        <p:nvPr/>
+      </p:nvGrpSpPr>
+      <p:grpSpPr>
+        <a:xfrm>
+          <a:off x="0" y="0"/>
+          <a:ext cx="0" cy="0"/>
+          <a:chOff x="0" y="0"/>
+          <a:chExt cx="0" cy="0"/>
+        </a:xfrm>
+      </p:grpSpPr>
+      <p:sp>
+        <p:nvSpPr>
+          <p:cNvPr id="4" name="Content Placeholder 3"/>
+          <p:cNvSpPr txBox="1">
+            <a:spLocks noGrp="1"/>
+          </p:cNvSpPr>
+          <p:nvPr>
+            <p:ph idx="1"/>
+          </p:nvPr>
+        </p:nvSpPr>
+        <p:spPr>
+          <a:xfrm>
+            <a:off x="310146" y="307538"/>
+            <a:ext cx="8526379" cy="1477328"/>
+          </a:xfrm>
+          <a:prstGeom prst="rect">
+            <a:avLst/>
+          </a:prstGeom>
+          <a:noFill/>
+        </p:spPr>
+        <p:txBody>
+          <a:bodyPr wrap="square" rtlCol="0">
+            <a:spAutoFit/>
+          </a:bodyPr>
+          <a:lstStyle/>
+          <a:p>
+            <a:pPr marL="36576" indent="0">
+              <a:buNone/>
+            </a:pPr>
+            <a:r>
+              <a:rPr lang="it-IT" dirty="0" smtClean="0"/>
+              <a:t>Analogamente all'ingegneria </a:t>
+            </a:r>
+            <a:r>
+              <a:rPr lang="it-IT" dirty="0"/>
+              <a:t>del </a:t>
+            </a:r>
+            <a:r>
+              <a:rPr lang="it-IT" dirty="0" smtClean="0"/>
+              <a:t>software, tali discipline applicano tecniche </a:t>
+            </a:r>
+            <a:r>
+              <a:rPr lang="it-IT" dirty="0"/>
+              <a:t>sviluppate dai professionisti invece che dai teorici</a:t>
+            </a:r>
+            <a:r>
+              <a:rPr lang="it-IT" dirty="0" smtClean="0"/>
+              <a:t>.</a:t>
+            </a:r>
+            <a:endParaRPr lang="it-IT" dirty="0"/>
+          </a:p>
+        </p:txBody>
+      </p:sp>
+      <p:sp>
+        <p:nvSpPr>
+          <p:cNvPr id="6" name="TextBox 5"/>
+          <p:cNvSpPr txBox="1"/>
+          <p:nvPr/>
+        </p:nvSpPr>
+        <p:spPr>
+          <a:xfrm>
+            <a:off x="310146" y="2236264"/>
+            <a:ext cx="8526379" cy="553998"/>
+          </a:xfrm>
+          <a:prstGeom prst="rect">
+            <a:avLst/>
+          </a:prstGeom>
+          <a:noFill/>
+        </p:spPr>
+        <p:txBody>
+          <a:bodyPr wrap="square" rtlCol="0">
+            <a:spAutoFit/>
+          </a:bodyPr>
+          <a:lstStyle/>
+          <a:p>
+            <a:r>
+              <a:rPr lang="en-US" sz="3000" dirty="0" smtClean="0"/>
+              <a:t>Ne </a:t>
+            </a:r>
+            <a:r>
+              <a:rPr lang="en-US" sz="3000" dirty="0" err="1" smtClean="0"/>
+              <a:t>è</a:t>
+            </a:r>
+            <a:r>
+              <a:rPr lang="en-US" sz="3000" dirty="0" smtClean="0"/>
+              <a:t> un </a:t>
+            </a:r>
+            <a:r>
+              <a:rPr lang="en-US" sz="3000" dirty="0" err="1" smtClean="0"/>
+              <a:t>esempio</a:t>
+            </a:r>
+            <a:r>
+              <a:rPr lang="en-US" sz="3000" dirty="0" smtClean="0"/>
+              <a:t> la </a:t>
+            </a:r>
+            <a:r>
+              <a:rPr lang="en-US" sz="3000" b="1" dirty="0" err="1" smtClean="0">
+                <a:solidFill>
+                  <a:srgbClr val="FF0000"/>
+                </a:solidFill>
+              </a:rPr>
+              <a:t>psicoanalisi</a:t>
+            </a:r>
+            <a:r>
+              <a:rPr lang="en-US" sz="3000" b="1" dirty="0" smtClean="0">
+                <a:solidFill>
+                  <a:srgbClr val="FF0000"/>
+                </a:solidFill>
+              </a:rPr>
+              <a:t> </a:t>
+            </a:r>
+            <a:endParaRPr lang="en-US" sz="3000" b="1" dirty="0">
+              <a:solidFill>
+                <a:srgbClr val="FF0000"/>
+              </a:solidFill>
+            </a:endParaRPr>
+          </a:p>
+        </p:txBody>
+      </p:sp>
+      <p:pic>
+        <p:nvPicPr>
+          <p:cNvPr id="8" name="Picture 7" descr="screenshot_2015-09-26_at_12.33.24.png"/>
+          <p:cNvPicPr>
+            <a:picLocks noChangeAspect="1"/>
+          </p:cNvPicPr>
+          <p:nvPr/>
+        </p:nvPicPr>
+        <p:blipFill>
+          <a:blip r:embed="rId2">
+            <a:extLst>
+              <a:ext uri="{28A0092B-C50C-407E-A947-70E740481C1C}">
+                <a14:useLocalDpi xmlns:a14="http://schemas.microsoft.com/office/drawing/2010/main" val="0"/>
+              </a:ext>
+            </a:extLst>
+          </a:blip>
+          <a:stretch>
+            <a:fillRect/>
+          </a:stretch>
+        </p:blipFill>
+        <p:spPr>
+          <a:xfrm>
+            <a:off x="6080687" y="2289684"/>
+            <a:ext cx="2862785" cy="2536524"/>
+          </a:xfrm>
+          <a:prstGeom prst="rect">
+            <a:avLst/>
+          </a:prstGeom>
+        </p:spPr>
+      </p:pic>
+      <p:sp>
+        <p:nvSpPr>
+          <p:cNvPr id="9" name="TextBox 8"/>
+          <p:cNvSpPr txBox="1"/>
+          <p:nvPr/>
+        </p:nvSpPr>
+        <p:spPr>
+          <a:xfrm>
+            <a:off x="310146" y="3557946"/>
+            <a:ext cx="8429960" cy="3139321"/>
+          </a:xfrm>
+          <a:prstGeom prst="rect">
+            <a:avLst/>
+          </a:prstGeom>
+          <a:noFill/>
+        </p:spPr>
+        <p:txBody>
+          <a:bodyPr wrap="square" rtlCol="0">
+            <a:spAutoFit/>
+          </a:bodyPr>
+          <a:lstStyle/>
+          <a:p>
+            <a:r>
+              <a:rPr lang="it-IT" sz="3000" dirty="0"/>
+              <a:t>La psicoanalisi appartiene alle </a:t>
+            </a:r>
+            <a:endParaRPr lang="it-IT" sz="3000" dirty="0" smtClean="0"/>
+          </a:p>
+          <a:p>
+            <a:r>
+              <a:rPr lang="en-US" sz="3000" dirty="0"/>
+              <a:t>c</a:t>
+            </a:r>
+            <a:r>
+              <a:rPr lang="it-IT" sz="3000" dirty="0" err="1" smtClean="0"/>
+              <a:t>osiddette</a:t>
+            </a:r>
+            <a:r>
+              <a:rPr lang="it-IT" sz="3000" dirty="0" smtClean="0"/>
+              <a:t> pseudoscienze</a:t>
+            </a:r>
+            <a:r>
+              <a:rPr lang="it-IT" sz="3000" dirty="0"/>
+              <a:t>, </a:t>
+            </a:r>
+            <a:endParaRPr lang="it-IT" sz="3000" dirty="0" smtClean="0"/>
+          </a:p>
+          <a:p>
+            <a:r>
+              <a:rPr lang="it-IT" sz="3000" dirty="0" smtClean="0"/>
+              <a:t>nelle </a:t>
+            </a:r>
+            <a:r>
+              <a:rPr lang="it-IT" sz="3000" dirty="0"/>
+              <a:t>quali i fenomeni possono </a:t>
+            </a:r>
+            <a:endParaRPr lang="it-IT" sz="3000" dirty="0" smtClean="0"/>
+          </a:p>
+          <a:p>
+            <a:r>
+              <a:rPr lang="it-IT" sz="3000" dirty="0" smtClean="0"/>
+              <a:t>essere </a:t>
+            </a:r>
+            <a:r>
+              <a:rPr lang="it-IT" sz="3000" dirty="0"/>
+              <a:t>descritti attraverso un approccio empirico,  dove i risultati ottenuti si basano sull’osservazione dei fenomeni e non su teoremi. </a:t>
+            </a:r>
+          </a:p>
+          <a:p>
+            <a:endParaRPr lang="en-US" dirty="0"/>
+          </a:p>
+        </p:txBody>
+      </p:sp>
+    </p:spTree>
+    <p:extLst>
+      <p:ext uri="{BB962C8B-B14F-4D97-AF65-F5344CB8AC3E}">
+        <p14:creationId xmlns:p14="http://schemas.microsoft.com/office/powerpoint/2010/main" val="2844098543"/>
+      </p:ext>
+    </p:extLst>
+  </p:cSld>
+  <p:clrMapOvr>
+    <a:masterClrMapping/>
+  </p:clrMapOvr>
+  <p:timing>
+    <p:tnLst>
+      <p:par>
+        <p:cTn xmlns:p14="http://schemas.microsoft.com/office/powerpoint/2010/main" id="1" dur="indefinite" restart="never" nodeType="tmRoot"/>
+      </p:par>
+    </p:tnLst>
+  </p:timing>
+</p:sld>
+</file>
+
+<file path=ppt/slides/slide18.xml><?xml version="1.0" encoding="utf-8"?>
+<p:sld xmlns:a="http://schemas.openxmlformats.org/drawingml/2006/main" xmlns:r="http://schemas.openxmlformats.org/officeDocument/2006/relationships" xmlns:p="http://schemas.openxmlformats.org/presentationml/2006/main">
+  <p:cSld>
+    <p:spTree>
+      <p:nvGrpSpPr>
+        <p:cNvPr id="1" name=""/>
+        <p:cNvGrpSpPr/>
+        <p:nvPr/>
+      </p:nvGrpSpPr>
+      <p:grpSpPr>
+        <a:xfrm>
+          <a:off x="0" y="0"/>
+          <a:ext cx="0" cy="0"/>
+          <a:chOff x="0" y="0"/>
+          <a:chExt cx="0" cy="0"/>
+        </a:xfrm>
+      </p:grpSpPr>
+      <p:pic>
+        <p:nvPicPr>
+          <p:cNvPr id="4" name="Content Placeholder 3" descr="biancaneve-e-sette-nani-cocaina-638x425.jpg"/>
+          <p:cNvPicPr>
+            <a:picLocks noGrp="1" noChangeAspect="1"/>
+          </p:cNvPicPr>
+          <p:nvPr>
+            <p:ph idx="1"/>
+          </p:nvPr>
+        </p:nvPicPr>
+        <p:blipFill>
+          <a:blip r:embed="rId2">
+            <a:extLst>
+              <a:ext uri="{28A0092B-C50C-407E-A947-70E740481C1C}">
+                <a14:useLocalDpi xmlns:a14="http://schemas.microsoft.com/office/drawing/2010/main" val="0"/>
+              </a:ext>
+            </a:extLst>
+          </a:blip>
+          <a:srcRect l="5123" r="5123"/>
+          <a:stretch>
+            <a:fillRect/>
+          </a:stretch>
+        </p:blipFill>
+        <p:spPr>
+          <a:xfrm>
+            <a:off x="336885" y="266699"/>
+            <a:ext cx="8412558" cy="6243721"/>
+          </a:xfrm>
+        </p:spPr>
+        <p:style>
+          <a:lnRef idx="2">
+            <a:schemeClr val="dk1"/>
+          </a:lnRef>
+          <a:fillRef idx="1">
+            <a:schemeClr val="lt1"/>
+          </a:fillRef>
+          <a:effectRef idx="0">
+            <a:schemeClr val="dk1"/>
+          </a:effectRef>
+          <a:fontRef idx="minor">
+            <a:schemeClr val="dk1"/>
+          </a:fontRef>
+        </p:style>
+      </p:pic>
+      <p:sp>
+        <p:nvSpPr>
+          <p:cNvPr id="5" name="TextBox 4"/>
+          <p:cNvSpPr txBox="1"/>
+          <p:nvPr/>
+        </p:nvSpPr>
+        <p:spPr>
+          <a:xfrm>
+            <a:off x="1094240" y="5131690"/>
+            <a:ext cx="7025919" cy="861774"/>
+          </a:xfrm>
+          <a:prstGeom prst="rect">
+            <a:avLst/>
+          </a:prstGeom>
+        </p:spPr>
+        <p:style>
+          <a:lnRef idx="2">
+            <a:schemeClr val="dk1"/>
+          </a:lnRef>
+          <a:fillRef idx="1">
+            <a:schemeClr val="lt1"/>
+          </a:fillRef>
+          <a:effectRef idx="0">
+            <a:schemeClr val="dk1"/>
+          </a:effectRef>
+          <a:fontRef idx="minor">
+            <a:schemeClr val="dk1"/>
+          </a:fontRef>
+        </p:style>
+        <p:txBody>
+          <a:bodyPr wrap="none" rtlCol="0">
+            <a:spAutoFit/>
+          </a:bodyPr>
+          <a:lstStyle/>
+          <a:p>
+            <a:pPr algn="ctr"/>
+            <a:r>
+              <a:rPr lang="en-US" sz="5000" b="1" dirty="0" smtClean="0"/>
+              <a:t>Grazie per </a:t>
+            </a:r>
+            <a:r>
+              <a:rPr lang="en-US" sz="5000" b="1" dirty="0" err="1" smtClean="0"/>
+              <a:t>l’attenzione</a:t>
+            </a:r>
+            <a:endParaRPr lang="en-US" sz="5000" b="1" dirty="0" smtClean="0"/>
+          </a:p>
+        </p:txBody>
+      </p:sp>
+      <p:sp>
+        <p:nvSpPr>
+          <p:cNvPr id="6" name="TextBox 5"/>
+          <p:cNvSpPr txBox="1"/>
+          <p:nvPr/>
+        </p:nvSpPr>
+        <p:spPr>
+          <a:xfrm>
+            <a:off x="2446315" y="388324"/>
+            <a:ext cx="6303128" cy="707886"/>
+          </a:xfrm>
+          <a:prstGeom prst="rect">
+            <a:avLst/>
+          </a:prstGeom>
+        </p:spPr>
+        <p:style>
+          <a:lnRef idx="2">
+            <a:schemeClr val="dk1"/>
+          </a:lnRef>
+          <a:fillRef idx="1">
+            <a:schemeClr val="lt1"/>
+          </a:fillRef>
+          <a:effectRef idx="0">
+            <a:schemeClr val="dk1"/>
+          </a:effectRef>
+          <a:fontRef idx="minor">
+            <a:schemeClr val="dk1"/>
+          </a:fontRef>
+        </p:style>
+        <p:txBody>
+          <a:bodyPr wrap="none" rtlCol="0">
+            <a:spAutoFit/>
+          </a:bodyPr>
+          <a:lstStyle/>
+          <a:p>
+            <a:r>
+              <a:rPr lang="en-US" sz="4000" b="1" dirty="0" err="1" smtClean="0"/>
+              <a:t>TeamSoftwareRevolution</a:t>
+            </a:r>
+            <a:endParaRPr lang="en-US" sz="4000" b="1" dirty="0"/>
+          </a:p>
+        </p:txBody>
+      </p:sp>
+    </p:spTree>
+    <p:extLst>
+      <p:ext uri="{BB962C8B-B14F-4D97-AF65-F5344CB8AC3E}">
+        <p14:creationId xmlns:p14="http://schemas.microsoft.com/office/powerpoint/2010/main" val="132949217"/>
+      </p:ext>
+    </p:extLst>
+  </p:cSld>
+  <p:clrMapOvr>
+    <a:masterClrMapping/>
+  </p:clrMapOvr>
+  <p:timing>
+    <p:tnLst>
+      <p:par>
+        <p:cTn xmlns:p14="http://schemas.microsoft.com/office/powerpoint/2010/main" id="1" dur="indefinite" restart="never" nodeType="tmRoot">
+          <p:childTnLst>
+            <p:seq concurrent="1" nextAc="seek">
+              <p:cTn id="2" dur="indefinite" nodeType="mainSeq">
+                <p:childTnLst>
+                  <p:par>
+                    <p:cTn id="3" fill="hold">
+                      <p:stCondLst>
+                        <p:cond delay="indefinite"/>
+                      </p:stCondLst>
+                      <p:childTnLst>
+                        <p:par>
+                          <p:cTn id="4" fill="hold">
+                            <p:stCondLst>
+                              <p:cond delay="0"/>
+                            </p:stCondLst>
+                            <p:childTnLst>
+                              <p:par>
+                                <p:cTn id="5" presetID="6" presetClass="entr" presetSubtype="16" fill="hold" nodeType="clickEffect">
+                                  <p:stCondLst>
+                                    <p:cond delay="0"/>
+                                  </p:stCondLst>
+                                  <p:childTnLst>
+                                    <p:set>
+                                      <p:cBhvr>
+                                        <p:cTn id="6" dur="1" fill="hold">
+                                          <p:stCondLst>
+                                            <p:cond delay="0"/>
+                                          </p:stCondLst>
+                                        </p:cTn>
+                                        <p:tgtEl>
+                                          <p:spTgt spid="4"/>
+                                        </p:tgtEl>
+                                        <p:attrNameLst>
+                                          <p:attrName>style.visibility</p:attrName>
+                                        </p:attrNameLst>
+                                      </p:cBhvr>
+                                      <p:to>
+                                        <p:strVal val="visible"/>
+                                      </p:to>
+                                    </p:set>
+                                    <p:animEffect transition="in" filter="circle(in)">
+                                      <p:cBhvr>
+                                        <p:cTn id="7" dur="2000"/>
+                                        <p:tgtEl>
+                                          <p:spTgt spid="4"/>
+                                        </p:tgtEl>
+                                      </p:cBhvr>
+                                    </p:animEffect>
+                                  </p:childTnLst>
+                                </p:cTn>
+                              </p:par>
+                              <p:par>
+                                <p:cTn id="8" presetID="12" presetClass="entr" presetSubtype="4" fill="hold" grpId="0" nodeType="withEffect">
+                                  <p:stCondLst>
+                                    <p:cond delay="0"/>
+                                  </p:stCondLst>
+                                  <p:childTnLst>
+                                    <p:set>
+                                      <p:cBhvr>
+                                        <p:cTn id="9" dur="1" fill="hold">
+                                          <p:stCondLst>
+                                            <p:cond delay="0"/>
+                                          </p:stCondLst>
+                                        </p:cTn>
+                                        <p:tgtEl>
+                                          <p:spTgt spid="6"/>
+                                        </p:tgtEl>
+                                        <p:attrNameLst>
+                                          <p:attrName>style.visibility</p:attrName>
+                                        </p:attrNameLst>
+                                      </p:cBhvr>
+                                      <p:to>
+                                        <p:strVal val="visible"/>
+                                      </p:to>
+                                    </p:set>
+                                    <p:anim calcmode="lin" valueType="num">
+                                      <p:cBhvr additive="base">
+                                        <p:cTn id="10" dur="500"/>
+                                        <p:tgtEl>
+                                          <p:spTgt spid="6"/>
+                                        </p:tgtEl>
+                                        <p:attrNameLst>
+                                          <p:attrName>ppt_y</p:attrName>
+                                        </p:attrNameLst>
+                                      </p:cBhvr>
+                                      <p:tavLst>
+                                        <p:tav tm="0">
+                                          <p:val>
+                                            <p:strVal val="#ppt_y+#ppt_h*1.125000"/>
+                                          </p:val>
+                                        </p:tav>
+                                        <p:tav tm="100000">
+                                          <p:val>
+                                            <p:strVal val="#ppt_y"/>
+                                          </p:val>
+                                        </p:tav>
+                                      </p:tavLst>
+                                    </p:anim>
+                                    <p:animEffect transition="in" filter="wipe(up)">
+                                      <p:cBhvr>
+                                        <p:cTn id="11" dur="500"/>
+                                        <p:tgtEl>
+                                          <p:spTgt spid="6"/>
+                                        </p:tgtEl>
+                                      </p:cBhvr>
+                                    </p:animEffect>
+                                  </p:childTnLst>
+                                </p:cTn>
+                              </p:par>
+                            </p:childTnLst>
+                          </p:cTn>
+                        </p:par>
+                      </p:childTnLst>
+                    </p:cTn>
+                  </p:par>
+                  <p:par>
+                    <p:cTn id="12" fill="hold">
+                      <p:stCondLst>
+                        <p:cond delay="indefinite"/>
+                      </p:stCondLst>
+                      <p:childTnLst>
+                        <p:par>
+                          <p:cTn id="13" fill="hold">
+                            <p:stCondLst>
+                              <p:cond delay="0"/>
+                            </p:stCondLst>
+                            <p:childTnLst>
+                              <p:par>
+                                <p:cTn id="14" presetID="18" presetClass="entr" presetSubtype="12" fill="hold" grpId="0" nodeType="clickEffect">
+                                  <p:stCondLst>
+                                    <p:cond delay="0"/>
+                                  </p:stCondLst>
+                                  <p:childTnLst>
+                                    <p:set>
+                                      <p:cBhvr>
+                                        <p:cTn id="15" dur="1" fill="hold">
+                                          <p:stCondLst>
+                                            <p:cond delay="0"/>
+                                          </p:stCondLst>
+                                        </p:cTn>
+                                        <p:tgtEl>
+                                          <p:spTgt spid="5"/>
+                                        </p:tgtEl>
+                                        <p:attrNameLst>
+                                          <p:attrName>style.visibility</p:attrName>
+                                        </p:attrNameLst>
+                                      </p:cBhvr>
+                                      <p:to>
+                                        <p:strVal val="visible"/>
+                                      </p:to>
+                                    </p:set>
+                                    <p:animEffect transition="in" filter="strips(downLeft)">
+                                      <p:cBhvr>
+                                        <p:cTn id="16" dur="500"/>
+                                        <p:tgtEl>
+                                          <p:spTgt spid="5"/>
+                                        </p:tgtEl>
+                                      </p:cBhvr>
+                                    </p:animEffect>
+                                  </p:childTnLst>
+                                </p:cTn>
+                              </p:par>
+                            </p:childTnLst>
+                          </p:cTn>
+                        </p:par>
+                      </p:childTnLst>
+                    </p:cTn>
+                  </p:par>
+                </p:childTnLst>
+              </p:cTn>
+              <p:prevCondLst>
+                <p:cond evt="onPrev" delay="0">
+                  <p:tgtEl>
+                    <p:sldTgt/>
+                  </p:tgtEl>
+                </p:cond>
+              </p:prevCondLst>
+              <p:nextCondLst>
+                <p:cond evt="onNext" delay="0">
+                  <p:tgtEl>
+                    <p:sldTgt/>
+                  </p:tgtEl>
+                </p:cond>
+              </p:nextCondLst>
+            </p:seq>
+          </p:childTnLst>
+        </p:cTn>
+      </p:par>
+    </p:tnLst>
+    <p:bldLst>
+      <p:bldP spid="5" grpId="0" animBg="1"/>
+      <p:bldP spid="6" grpId="0" animBg="1"/>
+    </p:bldLst>
+  </p:timing>
 </p:sld>
 </file>
 
@@ -4921,176 +6185,293 @@
       </p:sp>
       <p:sp>
         <p:nvSpPr>
-          <p:cNvPr id="3" name="Content Placeholder 2"/>
-          <p:cNvSpPr>
-            <a:spLocks noGrp="1"/>
-          </p:cNvSpPr>
-          <p:nvPr>
-            <p:ph idx="1"/>
-          </p:nvPr>
+          <p:cNvPr id="5" name="TextBox 4"/>
+          <p:cNvSpPr txBox="1"/>
+          <p:nvPr/>
         </p:nvSpPr>
         <p:spPr>
           <a:xfrm>
-            <a:off x="457200" y="1283368"/>
-            <a:ext cx="8312484" cy="5347369"/>
+            <a:off x="457200" y="1578059"/>
+            <a:ext cx="8312484" cy="1292662"/>
           </a:xfrm>
+          <a:prstGeom prst="rect">
+            <a:avLst/>
+          </a:prstGeom>
+          <a:noFill/>
         </p:spPr>
         <p:txBody>
-          <a:bodyPr/>
+          <a:bodyPr wrap="square" rtlCol="0">
+            <a:spAutoFit/>
+          </a:bodyPr>
           <a:lstStyle/>
           <a:p>
-            <a:pPr marL="36576" indent="0">
-              <a:buNone/>
+            <a:r>
+              <a:rPr lang="en-US" sz="3000" dirty="0" err="1">
+                <a:solidFill>
+                  <a:srgbClr val="FF0000"/>
+                </a:solidFill>
+              </a:rPr>
+              <a:t>Una</a:t>
+            </a:r>
+            <a:r>
+              <a:rPr lang="en-US" sz="3000" dirty="0">
+                <a:solidFill>
+                  <a:srgbClr val="FF0000"/>
+                </a:solidFill>
+              </a:rPr>
+              <a:t> </a:t>
+            </a:r>
+            <a:r>
+              <a:rPr lang="en-US" sz="3000" dirty="0" err="1">
+                <a:solidFill>
+                  <a:srgbClr val="FF0000"/>
+                </a:solidFill>
+              </a:rPr>
+              <a:t>metrica</a:t>
+            </a:r>
+            <a:r>
+              <a:rPr lang="en-US" sz="3000" dirty="0">
+                <a:solidFill>
+                  <a:srgbClr val="FF0000"/>
+                </a:solidFill>
+              </a:rPr>
+              <a:t> </a:t>
+            </a:r>
+            <a:r>
+              <a:rPr lang="en-US" sz="3000" dirty="0" err="1">
+                <a:solidFill>
+                  <a:srgbClr val="FF0000"/>
+                </a:solidFill>
+              </a:rPr>
+              <a:t>è</a:t>
+            </a:r>
+            <a:r>
+              <a:rPr lang="en-US" sz="3000" dirty="0">
+                <a:solidFill>
+                  <a:srgbClr val="FF0000"/>
+                </a:solidFill>
+              </a:rPr>
+              <a:t> </a:t>
+            </a:r>
+            <a:r>
+              <a:rPr lang="en-US" sz="3000" dirty="0" err="1">
+                <a:solidFill>
+                  <a:srgbClr val="FF0000"/>
+                </a:solidFill>
+              </a:rPr>
+              <a:t>uno</a:t>
+            </a:r>
+            <a:r>
+              <a:rPr lang="en-US" sz="3000" dirty="0">
+                <a:solidFill>
+                  <a:srgbClr val="FF0000"/>
+                </a:solidFill>
+              </a:rPr>
+              <a:t> standard per la </a:t>
+            </a:r>
+            <a:r>
+              <a:rPr lang="en-US" sz="3000" dirty="0" err="1">
+                <a:solidFill>
+                  <a:srgbClr val="FF0000"/>
+                </a:solidFill>
+              </a:rPr>
+              <a:t>misura</a:t>
+            </a:r>
+            <a:r>
+              <a:rPr lang="en-US" sz="3000" dirty="0">
+                <a:solidFill>
+                  <a:srgbClr val="FF0000"/>
+                </a:solidFill>
+              </a:rPr>
+              <a:t> di </a:t>
+            </a:r>
+            <a:r>
+              <a:rPr lang="en-US" sz="3000" dirty="0" err="1">
+                <a:solidFill>
+                  <a:srgbClr val="FF0000"/>
+                </a:solidFill>
+              </a:rPr>
+              <a:t>alcune</a:t>
+            </a:r>
+            <a:r>
+              <a:rPr lang="en-US" sz="3000" dirty="0">
+                <a:solidFill>
+                  <a:srgbClr val="FF0000"/>
+                </a:solidFill>
+              </a:rPr>
+              <a:t> </a:t>
+            </a:r>
+            <a:r>
+              <a:rPr lang="en-US" sz="3000" dirty="0" err="1">
+                <a:solidFill>
+                  <a:srgbClr val="FF0000"/>
+                </a:solidFill>
+              </a:rPr>
+              <a:t>proprietà</a:t>
+            </a:r>
+            <a:r>
+              <a:rPr lang="en-US" sz="3000" dirty="0">
+                <a:solidFill>
+                  <a:srgbClr val="FF0000"/>
+                </a:solidFill>
+              </a:rPr>
+              <a:t> del SW.</a:t>
+            </a:r>
+          </a:p>
+          <a:p>
+            <a:endParaRPr lang="en-US" dirty="0"/>
+          </a:p>
+        </p:txBody>
+      </p:sp>
+      <p:sp>
+        <p:nvSpPr>
+          <p:cNvPr id="7" name="TextBox 6"/>
+          <p:cNvSpPr txBox="1"/>
+          <p:nvPr/>
+        </p:nvSpPr>
+        <p:spPr>
+          <a:xfrm>
+            <a:off x="457201" y="3141579"/>
+            <a:ext cx="8312484" cy="1292662"/>
+          </a:xfrm>
+          <a:prstGeom prst="rect">
+            <a:avLst/>
+          </a:prstGeom>
+          <a:noFill/>
+        </p:spPr>
+        <p:txBody>
+          <a:bodyPr wrap="square" rtlCol="0">
+            <a:spAutoFit/>
+          </a:bodyPr>
+          <a:lstStyle/>
+          <a:p>
+            <a:r>
+              <a:rPr lang="en-US" sz="3000" dirty="0" err="1"/>
+              <a:t>Queste</a:t>
+            </a:r>
+            <a:r>
+              <a:rPr lang="en-US" sz="3000" dirty="0"/>
+              <a:t> </a:t>
+            </a:r>
+            <a:r>
+              <a:rPr lang="en-US" sz="3000" dirty="0" err="1"/>
+              <a:t>metriche</a:t>
+            </a:r>
+            <a:r>
+              <a:rPr lang="en-US" sz="3000" dirty="0"/>
+              <a:t> </a:t>
+            </a:r>
+            <a:r>
+              <a:rPr lang="en-US" sz="3000" dirty="0" err="1"/>
+              <a:t>possono</a:t>
+            </a:r>
+            <a:r>
+              <a:rPr lang="en-US" sz="3000" dirty="0"/>
+              <a:t> </a:t>
+            </a:r>
+            <a:r>
+              <a:rPr lang="en-US" sz="3000" dirty="0" err="1"/>
+              <a:t>dividersi</a:t>
+            </a:r>
+            <a:r>
+              <a:rPr lang="en-US" sz="3000" dirty="0"/>
+              <a:t> in due </a:t>
+            </a:r>
+            <a:r>
+              <a:rPr lang="en-US" sz="3000" dirty="0" err="1"/>
+              <a:t>distinti</a:t>
+            </a:r>
+            <a:r>
+              <a:rPr lang="en-US" sz="3000" dirty="0"/>
+              <a:t> </a:t>
+            </a:r>
+            <a:r>
+              <a:rPr lang="en-US" sz="3000" dirty="0" err="1"/>
+              <a:t>insiemi</a:t>
+            </a:r>
+            <a:r>
+              <a:rPr lang="en-US" sz="3000" dirty="0"/>
+              <a:t>:</a:t>
+            </a:r>
+          </a:p>
+          <a:p>
+            <a:endParaRPr lang="en-US" dirty="0"/>
+          </a:p>
+        </p:txBody>
+      </p:sp>
+      <p:sp>
+        <p:nvSpPr>
+          <p:cNvPr id="8" name="TextBox 7"/>
+          <p:cNvSpPr txBox="1"/>
+          <p:nvPr/>
+        </p:nvSpPr>
+        <p:spPr>
+          <a:xfrm>
+            <a:off x="588210" y="4879474"/>
+            <a:ext cx="8181474" cy="553998"/>
+          </a:xfrm>
+          <a:prstGeom prst="rect">
+            <a:avLst/>
+          </a:prstGeom>
+          <a:noFill/>
+        </p:spPr>
+        <p:txBody>
+          <a:bodyPr wrap="square" rtlCol="0">
+            <a:spAutoFit/>
+          </a:bodyPr>
+          <a:lstStyle/>
+          <a:p>
+            <a:pPr marL="457200" indent="-457200">
+              <a:buFont typeface="Wingdings" charset="2"/>
+              <a:buChar char="u"/>
             </a:pPr>
             <a:r>
-              <a:rPr lang="en-US" dirty="0" err="1" smtClean="0"/>
-              <a:t>Una</a:t>
-            </a:r>
-            <a:r>
-              <a:rPr lang="en-US" dirty="0" smtClean="0"/>
-              <a:t> </a:t>
-            </a:r>
-            <a:r>
-              <a:rPr lang="en-US" dirty="0" err="1" smtClean="0"/>
-              <a:t>metrica</a:t>
-            </a:r>
-            <a:r>
-              <a:rPr lang="en-US" dirty="0" smtClean="0"/>
-              <a:t> </a:t>
-            </a:r>
-            <a:r>
-              <a:rPr lang="en-US" dirty="0" err="1" smtClean="0"/>
-              <a:t>è</a:t>
-            </a:r>
-            <a:r>
-              <a:rPr lang="en-US" dirty="0" smtClean="0"/>
-              <a:t> </a:t>
-            </a:r>
-            <a:r>
-              <a:rPr lang="en-US" dirty="0" err="1" smtClean="0"/>
-              <a:t>uno</a:t>
-            </a:r>
-            <a:r>
-              <a:rPr lang="en-US" dirty="0" smtClean="0"/>
-              <a:t> standard per la </a:t>
-            </a:r>
-            <a:r>
-              <a:rPr lang="en-US" dirty="0" err="1" smtClean="0"/>
-              <a:t>misura</a:t>
-            </a:r>
-            <a:r>
-              <a:rPr lang="en-US" dirty="0" smtClean="0"/>
-              <a:t> di </a:t>
-            </a:r>
-            <a:r>
-              <a:rPr lang="en-US" dirty="0" err="1" smtClean="0"/>
-              <a:t>alcune</a:t>
-            </a:r>
-            <a:r>
-              <a:rPr lang="en-US" dirty="0" smtClean="0"/>
-              <a:t> </a:t>
-            </a:r>
-            <a:r>
-              <a:rPr lang="en-US" dirty="0" err="1" smtClean="0"/>
-              <a:t>proprietà</a:t>
-            </a:r>
-            <a:r>
-              <a:rPr lang="en-US" dirty="0" smtClean="0"/>
-              <a:t> del SW.</a:t>
-            </a:r>
-          </a:p>
-          <a:p>
-            <a:pPr marL="36576" indent="0">
-              <a:buNone/>
+              <a:rPr lang="en-US" sz="3000" dirty="0"/>
+              <a:t>Di </a:t>
+            </a:r>
+            <a:r>
+              <a:rPr lang="en-US" sz="3000" dirty="0" err="1" smtClean="0"/>
+              <a:t>processo</a:t>
+            </a:r>
+            <a:endParaRPr lang="en-US" sz="3000" dirty="0"/>
+          </a:p>
+        </p:txBody>
+      </p:sp>
+      <p:sp>
+        <p:nvSpPr>
+          <p:cNvPr id="13" name="TextBox 12"/>
+          <p:cNvSpPr txBox="1"/>
+          <p:nvPr/>
+        </p:nvSpPr>
+        <p:spPr>
+          <a:xfrm>
+            <a:off x="588210" y="5605106"/>
+            <a:ext cx="8181474" cy="553998"/>
+          </a:xfrm>
+          <a:prstGeom prst="rect">
+            <a:avLst/>
+          </a:prstGeom>
+          <a:noFill/>
+        </p:spPr>
+        <p:txBody>
+          <a:bodyPr wrap="square" rtlCol="0">
+            <a:spAutoFit/>
+          </a:bodyPr>
+          <a:lstStyle/>
+          <a:p>
+            <a:pPr marL="457200" indent="-457200">
+              <a:buFont typeface="Wingdings" charset="2"/>
+              <a:buChar char="u"/>
             </a:pPr>
-            <a:endParaRPr lang="en-US" dirty="0"/>
-          </a:p>
-          <a:p>
-            <a:pPr marL="36576" indent="0">
-              <a:buNone/>
-            </a:pPr>
-            <a:r>
-              <a:rPr lang="en-US" dirty="0" err="1" smtClean="0"/>
-              <a:t>Queste</a:t>
-            </a:r>
-            <a:r>
-              <a:rPr lang="en-US" dirty="0" smtClean="0"/>
-              <a:t> </a:t>
-            </a:r>
-            <a:r>
-              <a:rPr lang="en-US" dirty="0" err="1" smtClean="0"/>
-              <a:t>metriche</a:t>
-            </a:r>
-            <a:r>
-              <a:rPr lang="en-US" dirty="0" smtClean="0"/>
-              <a:t> </a:t>
-            </a:r>
-            <a:r>
-              <a:rPr lang="en-US" dirty="0" err="1" smtClean="0"/>
-              <a:t>possono</a:t>
-            </a:r>
-            <a:r>
-              <a:rPr lang="en-US" dirty="0" smtClean="0"/>
-              <a:t> </a:t>
-            </a:r>
-            <a:r>
-              <a:rPr lang="en-US" dirty="0" err="1" smtClean="0"/>
-              <a:t>dividersi</a:t>
-            </a:r>
-            <a:r>
-              <a:rPr lang="en-US" dirty="0" smtClean="0"/>
-              <a:t> in due </a:t>
-            </a:r>
-            <a:r>
-              <a:rPr lang="en-US" dirty="0" err="1" smtClean="0"/>
-              <a:t>distinti</a:t>
-            </a:r>
-            <a:r>
-              <a:rPr lang="en-US" dirty="0" smtClean="0"/>
-              <a:t> </a:t>
-            </a:r>
-            <a:r>
-              <a:rPr lang="en-US" dirty="0" err="1" smtClean="0"/>
-              <a:t>insiemi</a:t>
-            </a:r>
-            <a:r>
-              <a:rPr lang="en-US" dirty="0" smtClean="0"/>
-              <a:t>:</a:t>
-            </a:r>
-          </a:p>
-          <a:p>
-            <a:pPr marL="36576" indent="0">
-              <a:buNone/>
-            </a:pPr>
-            <a:endParaRPr lang="en-US" dirty="0" smtClean="0"/>
-          </a:p>
-          <a:p>
-            <a:r>
-              <a:rPr lang="en-US" dirty="0" smtClean="0"/>
+            <a:r>
+              <a:rPr lang="en-US" sz="3000" dirty="0" smtClean="0"/>
               <a:t>Di </a:t>
             </a:r>
             <a:r>
-              <a:rPr lang="en-US" dirty="0" err="1" smtClean="0"/>
-              <a:t>processo</a:t>
-            </a:r>
-            <a:endParaRPr lang="en-US" dirty="0" smtClean="0"/>
-          </a:p>
-          <a:p>
-            <a:r>
-              <a:rPr lang="en-US" dirty="0" smtClean="0"/>
-              <a:t>Di </a:t>
-            </a:r>
-            <a:r>
-              <a:rPr lang="en-US" dirty="0" err="1" smtClean="0"/>
+              <a:rPr lang="en-US" sz="3000" dirty="0" err="1" smtClean="0"/>
               <a:t>prodotto</a:t>
             </a:r>
-            <a:endParaRPr lang="en-US" dirty="0" smtClean="0"/>
-          </a:p>
-          <a:p>
-            <a:pPr marL="36576" indent="0">
-              <a:buNone/>
-            </a:pPr>
-            <a:endParaRPr lang="en-US" dirty="0"/>
+            <a:endParaRPr lang="en-US" sz="3000" dirty="0"/>
           </a:p>
         </p:txBody>
       </p:sp>
@@ -5104,12 +6485,391 @@
   <p:clrMapOvr>
     <a:masterClrMapping/>
   </p:clrMapOvr>
+  <mc:AlternateContent xmlns:mc="http://schemas.openxmlformats.org/markup-compatibility/2006">
+    <mc:Choice xmlns:p14="http://schemas.microsoft.com/office/powerpoint/2010/main" Requires="p14">
+      <p:transition p14:dur="0"/>
+    </mc:Choice>
+    <mc:Fallback>
+      <p:transition xmlns:p14="http://schemas.microsoft.com/office/powerpoint/2010/main"/>
+    </mc:Fallback>
+  </mc:AlternateContent>
   <p:timing>
     <p:tnLst>
       <p:par>
-        <p:cTn xmlns:p14="http://schemas.microsoft.com/office/powerpoint/2010/main" id="1" dur="indefinite" restart="never" nodeType="tmRoot"/>
+        <p:cTn xmlns:p14="http://schemas.microsoft.com/office/powerpoint/2010/main" id="1" dur="indefinite" restart="never" nodeType="tmRoot">
+          <p:childTnLst>
+            <p:seq concurrent="1" nextAc="seek">
+              <p:cTn id="2" dur="indefinite" nodeType="mainSeq">
+                <p:childTnLst>
+                  <p:par>
+                    <p:cTn id="3" fill="hold">
+                      <p:stCondLst>
+                        <p:cond delay="indefinite"/>
+                      </p:stCondLst>
+                      <p:childTnLst>
+                        <p:par>
+                          <p:cTn id="4" fill="hold">
+                            <p:stCondLst>
+                              <p:cond delay="0"/>
+                            </p:stCondLst>
+                            <p:childTnLst>
+                              <p:par>
+                                <p:cTn id="5" presetID="2" presetClass="entr" presetSubtype="4" fill="hold" grpId="0" nodeType="clickEffect">
+                                  <p:stCondLst>
+                                    <p:cond delay="0"/>
+                                  </p:stCondLst>
+                                  <p:childTnLst>
+                                    <p:set>
+                                      <p:cBhvr>
+                                        <p:cTn id="6" dur="1" fill="hold">
+                                          <p:stCondLst>
+                                            <p:cond delay="0"/>
+                                          </p:stCondLst>
+                                        </p:cTn>
+                                        <p:tgtEl>
+                                          <p:spTgt spid="5"/>
+                                        </p:tgtEl>
+                                        <p:attrNameLst>
+                                          <p:attrName>style.visibility</p:attrName>
+                                        </p:attrNameLst>
+                                      </p:cBhvr>
+                                      <p:to>
+                                        <p:strVal val="visible"/>
+                                      </p:to>
+                                    </p:set>
+                                    <p:anim calcmode="lin" valueType="num">
+                                      <p:cBhvr additive="base">
+                                        <p:cTn id="7" dur="500" fill="hold"/>
+                                        <p:tgtEl>
+                                          <p:spTgt spid="5"/>
+                                        </p:tgtEl>
+                                        <p:attrNameLst>
+                                          <p:attrName>ppt_x</p:attrName>
+                                        </p:attrNameLst>
+                                      </p:cBhvr>
+                                      <p:tavLst>
+                                        <p:tav tm="0">
+                                          <p:val>
+                                            <p:strVal val="#ppt_x"/>
+                                          </p:val>
+                                        </p:tav>
+                                        <p:tav tm="100000">
+                                          <p:val>
+                                            <p:strVal val="#ppt_x"/>
+                                          </p:val>
+                                        </p:tav>
+                                      </p:tavLst>
+                                    </p:anim>
+                                    <p:anim calcmode="lin" valueType="num">
+                                      <p:cBhvr additive="base">
+                                        <p:cTn id="8" dur="500" fill="hold"/>
+                                        <p:tgtEl>
+                                          <p:spTgt spid="5"/>
+                                        </p:tgtEl>
+                                        <p:attrNameLst>
+                                          <p:attrName>ppt_y</p:attrName>
+                                        </p:attrNameLst>
+                                      </p:cBhvr>
+                                      <p:tavLst>
+                                        <p:tav tm="0">
+                                          <p:val>
+                                            <p:strVal val="1+#ppt_h/2"/>
+                                          </p:val>
+                                        </p:tav>
+                                        <p:tav tm="100000">
+                                          <p:val>
+                                            <p:strVal val="#ppt_y"/>
+                                          </p:val>
+                                        </p:tav>
+                                      </p:tavLst>
+                                    </p:anim>
+                                  </p:childTnLst>
+                                </p:cTn>
+                              </p:par>
+                            </p:childTnLst>
+                          </p:cTn>
+                        </p:par>
+                      </p:childTnLst>
+                    </p:cTn>
+                  </p:par>
+                  <p:par>
+                    <p:cTn id="9" fill="hold">
+                      <p:stCondLst>
+                        <p:cond delay="indefinite"/>
+                      </p:stCondLst>
+                      <p:childTnLst>
+                        <p:par>
+                          <p:cTn id="10" fill="hold">
+                            <p:stCondLst>
+                              <p:cond delay="0"/>
+                            </p:stCondLst>
+                            <p:childTnLst>
+                              <p:par>
+                                <p:cTn id="11" presetID="37" presetClass="entr" presetSubtype="0" fill="hold" grpId="0" nodeType="clickEffect">
+                                  <p:stCondLst>
+                                    <p:cond delay="0"/>
+                                  </p:stCondLst>
+                                  <p:childTnLst>
+                                    <p:set>
+                                      <p:cBhvr>
+                                        <p:cTn id="12" dur="1" fill="hold">
+                                          <p:stCondLst>
+                                            <p:cond delay="0"/>
+                                          </p:stCondLst>
+                                        </p:cTn>
+                                        <p:tgtEl>
+                                          <p:spTgt spid="8"/>
+                                        </p:tgtEl>
+                                        <p:attrNameLst>
+                                          <p:attrName>style.visibility</p:attrName>
+                                        </p:attrNameLst>
+                                      </p:cBhvr>
+                                      <p:to>
+                                        <p:strVal val="visible"/>
+                                      </p:to>
+                                    </p:set>
+                                    <p:animEffect transition="in" filter="fade">
+                                      <p:cBhvr>
+                                        <p:cTn id="13" dur="1000"/>
+                                        <p:tgtEl>
+                                          <p:spTgt spid="8"/>
+                                        </p:tgtEl>
+                                      </p:cBhvr>
+                                    </p:animEffect>
+                                    <p:anim calcmode="lin" valueType="num">
+                                      <p:cBhvr>
+                                        <p:cTn id="14" dur="1000" fill="hold"/>
+                                        <p:tgtEl>
+                                          <p:spTgt spid="8"/>
+                                        </p:tgtEl>
+                                        <p:attrNameLst>
+                                          <p:attrName>ppt_x</p:attrName>
+                                        </p:attrNameLst>
+                                      </p:cBhvr>
+                                      <p:tavLst>
+                                        <p:tav tm="0">
+                                          <p:val>
+                                            <p:strVal val="#ppt_x"/>
+                                          </p:val>
+                                        </p:tav>
+                                        <p:tav tm="100000">
+                                          <p:val>
+                                            <p:strVal val="#ppt_x"/>
+                                          </p:val>
+                                        </p:tav>
+                                      </p:tavLst>
+                                    </p:anim>
+                                    <p:anim calcmode="lin" valueType="num">
+                                      <p:cBhvr>
+                                        <p:cTn id="15" dur="900" decel="100000" fill="hold"/>
+                                        <p:tgtEl>
+                                          <p:spTgt spid="8"/>
+                                        </p:tgtEl>
+                                        <p:attrNameLst>
+                                          <p:attrName>ppt_y</p:attrName>
+                                        </p:attrNameLst>
+                                      </p:cBhvr>
+                                      <p:tavLst>
+                                        <p:tav tm="0">
+                                          <p:val>
+                                            <p:strVal val="#ppt_y+1"/>
+                                          </p:val>
+                                        </p:tav>
+                                        <p:tav tm="100000">
+                                          <p:val>
+                                            <p:strVal val="#ppt_y-.03"/>
+                                          </p:val>
+                                        </p:tav>
+                                      </p:tavLst>
+                                    </p:anim>
+                                    <p:anim calcmode="lin" valueType="num">
+                                      <p:cBhvr>
+                                        <p:cTn id="16" dur="100" accel="100000" fill="hold">
+                                          <p:stCondLst>
+                                            <p:cond delay="900"/>
+                                          </p:stCondLst>
+                                        </p:cTn>
+                                        <p:tgtEl>
+                                          <p:spTgt spid="8"/>
+                                        </p:tgtEl>
+                                        <p:attrNameLst>
+                                          <p:attrName>ppt_y</p:attrName>
+                                        </p:attrNameLst>
+                                      </p:cBhvr>
+                                      <p:tavLst>
+                                        <p:tav tm="0">
+                                          <p:val>
+                                            <p:strVal val="#ppt_y-.03"/>
+                                          </p:val>
+                                        </p:tav>
+                                        <p:tav tm="100000">
+                                          <p:val>
+                                            <p:strVal val="#ppt_y"/>
+                                          </p:val>
+                                        </p:tav>
+                                      </p:tavLst>
+                                    </p:anim>
+                                  </p:childTnLst>
+                                </p:cTn>
+                              </p:par>
+                            </p:childTnLst>
+                          </p:cTn>
+                        </p:par>
+                      </p:childTnLst>
+                    </p:cTn>
+                  </p:par>
+                  <p:par>
+                    <p:cTn id="17" fill="hold">
+                      <p:stCondLst>
+                        <p:cond delay="indefinite"/>
+                      </p:stCondLst>
+                      <p:childTnLst>
+                        <p:par>
+                          <p:cTn id="18" fill="hold">
+                            <p:stCondLst>
+                              <p:cond delay="0"/>
+                            </p:stCondLst>
+                            <p:childTnLst>
+                              <p:par>
+                                <p:cTn id="19" presetID="37" presetClass="entr" presetSubtype="0" fill="hold" grpId="0" nodeType="clickEffect">
+                                  <p:stCondLst>
+                                    <p:cond delay="0"/>
+                                  </p:stCondLst>
+                                  <p:childTnLst>
+                                    <p:set>
+                                      <p:cBhvr>
+                                        <p:cTn id="20" dur="1" fill="hold">
+                                          <p:stCondLst>
+                                            <p:cond delay="0"/>
+                                          </p:stCondLst>
+                                        </p:cTn>
+                                        <p:tgtEl>
+                                          <p:spTgt spid="13"/>
+                                        </p:tgtEl>
+                                        <p:attrNameLst>
+                                          <p:attrName>style.visibility</p:attrName>
+                                        </p:attrNameLst>
+                                      </p:cBhvr>
+                                      <p:to>
+                                        <p:strVal val="visible"/>
+                                      </p:to>
+                                    </p:set>
+                                    <p:animEffect transition="in" filter="fade">
+                                      <p:cBhvr>
+                                        <p:cTn id="21" dur="1000"/>
+                                        <p:tgtEl>
+                                          <p:spTgt spid="13"/>
+                                        </p:tgtEl>
+                                      </p:cBhvr>
+                                    </p:animEffect>
+                                    <p:anim calcmode="lin" valueType="num">
+                                      <p:cBhvr>
+                                        <p:cTn id="22" dur="1000" fill="hold"/>
+                                        <p:tgtEl>
+                                          <p:spTgt spid="13"/>
+                                        </p:tgtEl>
+                                        <p:attrNameLst>
+                                          <p:attrName>ppt_x</p:attrName>
+                                        </p:attrNameLst>
+                                      </p:cBhvr>
+                                      <p:tavLst>
+                                        <p:tav tm="0">
+                                          <p:val>
+                                            <p:strVal val="#ppt_x"/>
+                                          </p:val>
+                                        </p:tav>
+                                        <p:tav tm="100000">
+                                          <p:val>
+                                            <p:strVal val="#ppt_x"/>
+                                          </p:val>
+                                        </p:tav>
+                                      </p:tavLst>
+                                    </p:anim>
+                                    <p:anim calcmode="lin" valueType="num">
+                                      <p:cBhvr>
+                                        <p:cTn id="23" dur="900" decel="100000" fill="hold"/>
+                                        <p:tgtEl>
+                                          <p:spTgt spid="13"/>
+                                        </p:tgtEl>
+                                        <p:attrNameLst>
+                                          <p:attrName>ppt_y</p:attrName>
+                                        </p:attrNameLst>
+                                      </p:cBhvr>
+                                      <p:tavLst>
+                                        <p:tav tm="0">
+                                          <p:val>
+                                            <p:strVal val="#ppt_y+1"/>
+                                          </p:val>
+                                        </p:tav>
+                                        <p:tav tm="100000">
+                                          <p:val>
+                                            <p:strVal val="#ppt_y-.03"/>
+                                          </p:val>
+                                        </p:tav>
+                                      </p:tavLst>
+                                    </p:anim>
+                                    <p:anim calcmode="lin" valueType="num">
+                                      <p:cBhvr>
+                                        <p:cTn id="24" dur="100" accel="100000" fill="hold">
+                                          <p:stCondLst>
+                                            <p:cond delay="900"/>
+                                          </p:stCondLst>
+                                        </p:cTn>
+                                        <p:tgtEl>
+                                          <p:spTgt spid="13"/>
+                                        </p:tgtEl>
+                                        <p:attrNameLst>
+                                          <p:attrName>ppt_y</p:attrName>
+                                        </p:attrNameLst>
+                                      </p:cBhvr>
+                                      <p:tavLst>
+                                        <p:tav tm="0">
+                                          <p:val>
+                                            <p:strVal val="#ppt_y-.03"/>
+                                          </p:val>
+                                        </p:tav>
+                                        <p:tav tm="100000">
+                                          <p:val>
+                                            <p:strVal val="#ppt_y"/>
+                                          </p:val>
+                                        </p:tav>
+                                      </p:tavLst>
+                                    </p:anim>
+                                  </p:childTnLst>
+                                </p:cTn>
+                              </p:par>
+                            </p:childTnLst>
+                          </p:cTn>
+                        </p:par>
+                      </p:childTnLst>
+                    </p:cTn>
+                  </p:par>
+                </p:childTnLst>
+              </p:cTn>
+              <p:prevCondLst>
+                <p:cond evt="onPrev" delay="0">
+                  <p:tgtEl>
+                    <p:sldTgt/>
+                  </p:tgtEl>
+                </p:cond>
+              </p:prevCondLst>
+              <p:nextCondLst>
+                <p:cond evt="onNext" delay="0">
+                  <p:tgtEl>
+                    <p:sldTgt/>
+                  </p:tgtEl>
+                </p:cond>
+              </p:nextCondLst>
+            </p:seq>
+          </p:childTnLst>
+        </p:cTn>
       </p:par>
     </p:tnLst>
+    <p:bldLst>
+      <p:bldP spid="5" grpId="0"/>
+      <p:bldP spid="8" grpId="0"/>
+      <p:bldP spid="13" grpId="0"/>
+    </p:bldLst>
   </p:timing>
 </p:sld>
 </file>
@@ -5981,56 +7741,11 @@
               <a:rPr lang="en-US" dirty="0" smtClean="0"/>
               <a:t>				</a:t>
             </a:r>
-            <a:r>
-              <a:rPr lang="en-US" dirty="0" err="1" smtClean="0"/>
-              <a:t>Lunghezza</a:t>
-            </a:r>
-            <a:r>
-              <a:rPr lang="en-US" dirty="0" smtClean="0"/>
-              <a:t> </a:t>
-            </a:r>
-            <a:r>
-              <a:rPr lang="en-US" dirty="0" err="1" smtClean="0"/>
-              <a:t>diversa</a:t>
-            </a:r>
-            <a:r>
-              <a:rPr lang="en-US" dirty="0" smtClean="0"/>
-              <a:t>,</a:t>
-            </a:r>
-          </a:p>
-          <a:p>
-            <a:pPr marL="36576" indent="0">
-              <a:buNone/>
-            </a:pPr>
-            <a:r>
-              <a:rPr lang="en-US" dirty="0"/>
-              <a:t>	</a:t>
-            </a:r>
-            <a:r>
-              <a:rPr lang="en-US" dirty="0" smtClean="0"/>
-              <a:t>			</a:t>
-            </a:r>
-            <a:r>
-              <a:rPr lang="en-US" dirty="0" err="1"/>
-              <a:t>s</a:t>
-            </a:r>
-            <a:r>
-              <a:rPr lang="en-US" dirty="0" err="1" smtClean="0"/>
-              <a:t>tesso</a:t>
-            </a:r>
-            <a:r>
-              <a:rPr lang="en-US" dirty="0" smtClean="0"/>
-              <a:t> </a:t>
-            </a:r>
-            <a:r>
-              <a:rPr lang="en-US" dirty="0" err="1" smtClean="0"/>
-              <a:t>risultato</a:t>
-            </a:r>
-            <a:r>
-              <a:rPr lang="en-US" dirty="0" smtClean="0"/>
-              <a:t>.</a:t>
-            </a:r>
-            <a:endParaRPr lang="en-US" dirty="0"/>
+            <a:endParaRPr lang="en-US" dirty="0">
+              <a:solidFill>
+                <a:srgbClr val="FF0000"/>
+              </a:solidFill>
+            </a:endParaRPr>
           </a:p>
         </p:txBody>
       </p:sp>
@@ -6094,6 +7809,101 @@
           </a:prstGeom>
         </p:spPr>
       </p:pic>
+      <p:sp>
+        <p:nvSpPr>
+          <p:cNvPr id="2" name="TextBox 1"/>
+          <p:cNvSpPr txBox="1"/>
+          <p:nvPr/>
+        </p:nvSpPr>
+        <p:spPr>
+          <a:xfrm>
+            <a:off x="4184317" y="4852737"/>
+            <a:ext cx="4545262" cy="1292662"/>
+          </a:xfrm>
+          <a:prstGeom prst="rect">
+            <a:avLst/>
+          </a:prstGeom>
+          <a:noFill/>
+        </p:spPr>
+        <p:txBody>
+          <a:bodyPr wrap="square" rtlCol="0">
+            <a:spAutoFit/>
+          </a:bodyPr>
+          <a:lstStyle/>
+          <a:p>
+            <a:pPr marL="36576" indent="0" algn="ctr">
+              <a:buNone/>
+            </a:pPr>
+            <a:r>
+              <a:rPr lang="en-US" sz="3000" b="1" dirty="0" err="1">
+                <a:solidFill>
+                  <a:srgbClr val="FF0000"/>
+                </a:solidFill>
+              </a:rPr>
+              <a:t>Lunghezza</a:t>
+            </a:r>
+            <a:r>
+              <a:rPr lang="en-US" sz="3000" b="1" dirty="0">
+                <a:solidFill>
+                  <a:srgbClr val="FF0000"/>
+                </a:solidFill>
+              </a:rPr>
+              <a:t> </a:t>
+            </a:r>
+            <a:r>
+              <a:rPr lang="en-US" sz="3000" b="1" dirty="0" err="1">
+                <a:solidFill>
+                  <a:srgbClr val="FF0000"/>
+                </a:solidFill>
+              </a:rPr>
+              <a:t>diversa</a:t>
+            </a:r>
+            <a:r>
+              <a:rPr lang="en-US" sz="3000" b="1" dirty="0" smtClean="0">
+                <a:solidFill>
+                  <a:srgbClr val="FF0000"/>
+                </a:solidFill>
+              </a:rPr>
+              <a:t>, </a:t>
+            </a:r>
+            <a:r>
+              <a:rPr lang="en-US" sz="3000" b="1" dirty="0" err="1" smtClean="0">
+                <a:solidFill>
+                  <a:srgbClr val="FF0000"/>
+                </a:solidFill>
+              </a:rPr>
+              <a:t>stesso</a:t>
+            </a:r>
+            <a:r>
+              <a:rPr lang="en-US" sz="3000" b="1" dirty="0" smtClean="0">
+                <a:solidFill>
+                  <a:srgbClr val="FF0000"/>
+                </a:solidFill>
+              </a:rPr>
+              <a:t> </a:t>
+            </a:r>
+            <a:r>
+              <a:rPr lang="en-US" sz="3000" b="1" dirty="0" err="1">
+                <a:solidFill>
+                  <a:srgbClr val="FF0000"/>
+                </a:solidFill>
+              </a:rPr>
+              <a:t>risultato</a:t>
+            </a:r>
+            <a:r>
+              <a:rPr lang="en-US" sz="3000" b="1" dirty="0">
+                <a:solidFill>
+                  <a:srgbClr val="FF0000"/>
+                </a:solidFill>
+              </a:rPr>
+              <a:t>.</a:t>
+            </a:r>
+          </a:p>
+          <a:p>
+            <a:endParaRPr lang="en-US" dirty="0"/>
+          </a:p>
+        </p:txBody>
+      </p:sp>
     </p:spTree>
     <p:extLst>
       <p:ext uri="{BB962C8B-B14F-4D97-AF65-F5344CB8AC3E}">
@@ -6107,9 +7917,400 @@
   <p:timing>
     <p:tnLst>
       <p:par>
-        <p:cTn xmlns:p14="http://schemas.microsoft.com/office/powerpoint/2010/main" id="1" dur="indefinite" restart="never" nodeType="tmRoot"/>
+        <p:cTn xmlns:p14="http://schemas.microsoft.com/office/powerpoint/2010/main" id="1" dur="indefinite" restart="never" nodeType="tmRoot">
+          <p:childTnLst>
+            <p:seq concurrent="1" nextAc="seek">
+              <p:cTn id="2" dur="indefinite" nodeType="mainSeq">
+                <p:childTnLst>
+                  <p:par>
+                    <p:cTn id="3" fill="hold">
+                      <p:stCondLst>
+                        <p:cond delay="indefinite"/>
+                      </p:stCondLst>
+                      <p:childTnLst>
+                        <p:par>
+                          <p:cTn id="4" fill="hold">
+                            <p:stCondLst>
+                              <p:cond delay="0"/>
+                            </p:stCondLst>
+                            <p:childTnLst>
+                              <p:par>
+                                <p:cTn id="5" presetID="15" presetClass="entr" presetSubtype="0" fill="hold" nodeType="clickEffect">
+                                  <p:stCondLst>
+                                    <p:cond delay="0"/>
+                                  </p:stCondLst>
+                                  <p:childTnLst>
+                                    <p:set>
+                                      <p:cBhvr>
+                                        <p:cTn id="6" dur="1" fill="hold">
+                                          <p:stCondLst>
+                                            <p:cond delay="0"/>
+                                          </p:stCondLst>
+                                        </p:cTn>
+                                        <p:tgtEl>
+                                          <p:spTgt spid="6"/>
+                                        </p:tgtEl>
+                                        <p:attrNameLst>
+                                          <p:attrName>style.visibility</p:attrName>
+                                        </p:attrNameLst>
+                                      </p:cBhvr>
+                                      <p:to>
+                                        <p:strVal val="visible"/>
+                                      </p:to>
+                                    </p:set>
+                                    <p:anim calcmode="lin" valueType="num">
+                                      <p:cBhvr>
+                                        <p:cTn id="7" dur="1000" fill="hold"/>
+                                        <p:tgtEl>
+                                          <p:spTgt spid="6"/>
+                                        </p:tgtEl>
+                                        <p:attrNameLst>
+                                          <p:attrName>ppt_w</p:attrName>
+                                        </p:attrNameLst>
+                                      </p:cBhvr>
+                                      <p:tavLst>
+                                        <p:tav tm="0">
+                                          <p:val>
+                                            <p:fltVal val="0"/>
+                                          </p:val>
+                                        </p:tav>
+                                        <p:tav tm="100000">
+                                          <p:val>
+                                            <p:strVal val="#ppt_w"/>
+                                          </p:val>
+                                        </p:tav>
+                                      </p:tavLst>
+                                    </p:anim>
+                                    <p:anim calcmode="lin" valueType="num">
+                                      <p:cBhvr>
+                                        <p:cTn id="8" dur="1000" fill="hold"/>
+                                        <p:tgtEl>
+                                          <p:spTgt spid="6"/>
+                                        </p:tgtEl>
+                                        <p:attrNameLst>
+                                          <p:attrName>ppt_h</p:attrName>
+                                        </p:attrNameLst>
+                                      </p:cBhvr>
+                                      <p:tavLst>
+                                        <p:tav tm="0">
+                                          <p:val>
+                                            <p:fltVal val="0"/>
+                                          </p:val>
+                                        </p:tav>
+                                        <p:tav tm="100000">
+                                          <p:val>
+                                            <p:strVal val="#ppt_h"/>
+                                          </p:val>
+                                        </p:tav>
+                                      </p:tavLst>
+                                    </p:anim>
+                                    <p:anim calcmode="lin" valueType="num">
+                                      <p:cBhvr>
+                                        <p:cTn id="9" dur="1000" fill="hold"/>
+                                        <p:tgtEl>
+                                          <p:spTgt spid="6"/>
+                                        </p:tgtEl>
+                                        <p:attrNameLst>
+                                          <p:attrName>ppt_x</p:attrName>
+                                        </p:attrNameLst>
+                                      </p:cBhvr>
+                                      <p:tavLst>
+                                        <p:tav tm="0" fmla="#ppt_x+(cos(-2*pi*(1-$))*-#ppt_x-sin(-2*pi*(1-$))*(1-#ppt_y))*(1-$)">
+                                          <p:val>
+                                            <p:fltVal val="0"/>
+                                          </p:val>
+                                        </p:tav>
+                                        <p:tav tm="100000">
+                                          <p:val>
+                                            <p:fltVal val="1"/>
+                                          </p:val>
+                                        </p:tav>
+                                      </p:tavLst>
+                                    </p:anim>
+                                    <p:anim calcmode="lin" valueType="num">
+                                      <p:cBhvr>
+                                        <p:cTn id="10" dur="1000" fill="hold"/>
+                                        <p:tgtEl>
+                                          <p:spTgt spid="6"/>
+                                        </p:tgtEl>
+                                        <p:attrNameLst>
+                                          <p:attrName>ppt_y</p:attrName>
+                                        </p:attrNameLst>
+                                      </p:cBhvr>
+                                      <p:tavLst>
+                                        <p:tav tm="0" fmla="#ppt_y+(sin(-2*pi*(1-$))*-#ppt_x+cos(-2*pi*(1-$))*(1-#ppt_y))*(1-$)">
+                                          <p:val>
+                                            <p:fltVal val="0"/>
+                                          </p:val>
+                                        </p:tav>
+                                        <p:tav tm="100000">
+                                          <p:val>
+                                            <p:fltVal val="1"/>
+                                          </p:val>
+                                        </p:tav>
+                                      </p:tavLst>
+                                    </p:anim>
+                                  </p:childTnLst>
+                                </p:cTn>
+                              </p:par>
+                            </p:childTnLst>
+                          </p:cTn>
+                        </p:par>
+                      </p:childTnLst>
+                    </p:cTn>
+                  </p:par>
+                  <p:par>
+                    <p:cTn id="11" fill="hold">
+                      <p:stCondLst>
+                        <p:cond delay="indefinite"/>
+                      </p:stCondLst>
+                      <p:childTnLst>
+                        <p:par>
+                          <p:cTn id="12" fill="hold">
+                            <p:stCondLst>
+                              <p:cond delay="0"/>
+                            </p:stCondLst>
+                            <p:childTnLst>
+                              <p:par>
+                                <p:cTn id="13" presetID="15" presetClass="entr" presetSubtype="0" fill="hold" nodeType="clickEffect">
+                                  <p:stCondLst>
+                                    <p:cond delay="0"/>
+                                  </p:stCondLst>
+                                  <p:childTnLst>
+                                    <p:set>
+                                      <p:cBhvr>
+                                        <p:cTn id="14" dur="1" fill="hold">
+                                          <p:stCondLst>
+                                            <p:cond delay="0"/>
+                                          </p:stCondLst>
+                                        </p:cTn>
+                                        <p:tgtEl>
+                                          <p:spTgt spid="5"/>
+                                        </p:tgtEl>
+                                        <p:attrNameLst>
+                                          <p:attrName>style.visibility</p:attrName>
+                                        </p:attrNameLst>
+                                      </p:cBhvr>
+                                      <p:to>
+                                        <p:strVal val="visible"/>
+                                      </p:to>
+                                    </p:set>
+                                    <p:anim calcmode="lin" valueType="num">
+                                      <p:cBhvr>
+                                        <p:cTn id="15" dur="1000" fill="hold"/>
+                                        <p:tgtEl>
+                                          <p:spTgt spid="5"/>
+                                        </p:tgtEl>
+                                        <p:attrNameLst>
+                                          <p:attrName>ppt_w</p:attrName>
+                                        </p:attrNameLst>
+                                      </p:cBhvr>
+                                      <p:tavLst>
+                                        <p:tav tm="0">
+                                          <p:val>
+                                            <p:fltVal val="0"/>
+                                          </p:val>
+                                        </p:tav>
+                                        <p:tav tm="100000">
+                                          <p:val>
+                                            <p:strVal val="#ppt_w"/>
+                                          </p:val>
+                                        </p:tav>
+                                      </p:tavLst>
+                                    </p:anim>
+                                    <p:anim calcmode="lin" valueType="num">
+                                      <p:cBhvr>
+                                        <p:cTn id="16" dur="1000" fill="hold"/>
+                                        <p:tgtEl>
+                                          <p:spTgt spid="5"/>
+                                        </p:tgtEl>
+                                        <p:attrNameLst>
+                                          <p:attrName>ppt_h</p:attrName>
+                                        </p:attrNameLst>
+                                      </p:cBhvr>
+                                      <p:tavLst>
+                                        <p:tav tm="0">
+                                          <p:val>
+                                            <p:fltVal val="0"/>
+                                          </p:val>
+                                        </p:tav>
+                                        <p:tav tm="100000">
+                                          <p:val>
+                                            <p:strVal val="#ppt_h"/>
+                                          </p:val>
+                                        </p:tav>
+                                      </p:tavLst>
+                                    </p:anim>
+                                    <p:anim calcmode="lin" valueType="num">
+                                      <p:cBhvr>
+                                        <p:cTn id="17" dur="1000" fill="hold"/>
+                                        <p:tgtEl>
+                                          <p:spTgt spid="5"/>
+                                        </p:tgtEl>
+                                        <p:attrNameLst>
+                                          <p:attrName>ppt_x</p:attrName>
+                                        </p:attrNameLst>
+                                      </p:cBhvr>
+                                      <p:tavLst>
+                                        <p:tav tm="0" fmla="#ppt_x+(cos(-2*pi*(1-$))*-#ppt_x-sin(-2*pi*(1-$))*(1-#ppt_y))*(1-$)">
+                                          <p:val>
+                                            <p:fltVal val="0"/>
+                                          </p:val>
+                                        </p:tav>
+                                        <p:tav tm="100000">
+                                          <p:val>
+                                            <p:fltVal val="1"/>
+                                          </p:val>
+                                        </p:tav>
+                                      </p:tavLst>
+                                    </p:anim>
+                                    <p:anim calcmode="lin" valueType="num">
+                                      <p:cBhvr>
+                                        <p:cTn id="18" dur="1000" fill="hold"/>
+                                        <p:tgtEl>
+                                          <p:spTgt spid="5"/>
+                                        </p:tgtEl>
+                                        <p:attrNameLst>
+                                          <p:attrName>ppt_y</p:attrName>
+                                        </p:attrNameLst>
+                                      </p:cBhvr>
+                                      <p:tavLst>
+                                        <p:tav tm="0" fmla="#ppt_y+(sin(-2*pi*(1-$))*-#ppt_x+cos(-2*pi*(1-$))*(1-#ppt_y))*(1-$)">
+                                          <p:val>
+                                            <p:fltVal val="0"/>
+                                          </p:val>
+                                        </p:tav>
+                                        <p:tav tm="100000">
+                                          <p:val>
+                                            <p:fltVal val="1"/>
+                                          </p:val>
+                                        </p:tav>
+                                      </p:tavLst>
+                                    </p:anim>
+                                  </p:childTnLst>
+                                </p:cTn>
+                              </p:par>
+                            </p:childTnLst>
+                          </p:cTn>
+                        </p:par>
+                      </p:childTnLst>
+                    </p:cTn>
+                  </p:par>
+                  <p:par>
+                    <p:cTn id="19" fill="hold">
+                      <p:stCondLst>
+                        <p:cond delay="indefinite"/>
+                      </p:stCondLst>
+                      <p:childTnLst>
+                        <p:par>
+                          <p:cTn id="20" fill="hold">
+                            <p:stCondLst>
+                              <p:cond delay="0"/>
+                            </p:stCondLst>
+                            <p:childTnLst>
+                              <p:par>
+                                <p:cTn id="21" presetID="23" presetClass="entr" presetSubtype="16" fill="hold" grpId="0" nodeType="clickEffect">
+                                  <p:stCondLst>
+                                    <p:cond delay="0"/>
+                                  </p:stCondLst>
+                                  <p:childTnLst>
+                                    <p:set>
+                                      <p:cBhvr>
+                                        <p:cTn id="22" dur="1" fill="hold">
+                                          <p:stCondLst>
+                                            <p:cond delay="0"/>
+                                          </p:stCondLst>
+                                        </p:cTn>
+                                        <p:tgtEl>
+                                          <p:spTgt spid="2"/>
+                                        </p:tgtEl>
+                                        <p:attrNameLst>
+                                          <p:attrName>style.visibility</p:attrName>
+                                        </p:attrNameLst>
+                                      </p:cBhvr>
+                                      <p:to>
+                                        <p:strVal val="visible"/>
+                                      </p:to>
+                                    </p:set>
+                                    <p:anim calcmode="lin" valueType="num">
+                                      <p:cBhvr>
+                                        <p:cTn id="23" dur="500" fill="hold"/>
+                                        <p:tgtEl>
+                                          <p:spTgt spid="2"/>
+                                        </p:tgtEl>
+                                        <p:attrNameLst>
+                                          <p:attrName>ppt_w</p:attrName>
+                                        </p:attrNameLst>
+                                      </p:cBhvr>
+                                      <p:tavLst>
+                                        <p:tav tm="0">
+                                          <p:val>
+                                            <p:fltVal val="0"/>
+                                          </p:val>
+                                        </p:tav>
+                                        <p:tav tm="100000">
+                                          <p:val>
+                                            <p:strVal val="#ppt_w"/>
+                                          </p:val>
+                                        </p:tav>
+                                      </p:tavLst>
+                                    </p:anim>
+                                    <p:anim calcmode="lin" valueType="num">
+                                      <p:cBhvr>
+                                        <p:cTn id="24" dur="500" fill="hold"/>
+                                        <p:tgtEl>
+                                          <p:spTgt spid="2"/>
+                                        </p:tgtEl>
+                                        <p:attrNameLst>
+                                          <p:attrName>ppt_h</p:attrName>
+                                        </p:attrNameLst>
+                                      </p:cBhvr>
+                                      <p:tavLst>
+                                        <p:tav tm="0">
+                                          <p:val>
+                                            <p:fltVal val="0"/>
+                                          </p:val>
+                                        </p:tav>
+                                        <p:tav tm="100000">
+                                          <p:val>
+                                            <p:strVal val="#ppt_h"/>
+                                          </p:val>
+                                        </p:tav>
+                                      </p:tavLst>
+                                    </p:anim>
+                                  </p:childTnLst>
+                                </p:cTn>
+                              </p:par>
+                            </p:childTnLst>
+                          </p:cTn>
+                        </p:par>
+                      </p:childTnLst>
+                    </p:cTn>
+                  </p:par>
+                </p:childTnLst>
+              </p:cTn>
+              <p:prevCondLst>
+                <p:cond evt="onPrev" delay="0">
+                  <p:tgtEl>
+                    <p:sldTgt/>
+                  </p:tgtEl>
+                </p:cond>
+              </p:prevCondLst>
+              <p:nextCondLst>
+                <p:cond evt="onNext" delay="0">
+                  <p:tgtEl>
+                    <p:sldTgt/>
+                  </p:tgtEl>
+                </p:cond>
+              </p:nextCondLst>
+            </p:seq>
+          </p:childTnLst>
+        </p:cTn>
       </p:par>
     </p:tnLst>
+    <p:bldLst>
+      <p:bldP spid="2" grpId="0"/>
+    </p:bldLst>
   </p:timing>
 </p:sld>
 </file>
@@ -6172,11 +8373,7 @@
             </a:r>
             <a:r>
               <a:rPr lang="en-US" dirty="0" smtClean="0"/>
-              <a:t>:	Object</a:t>
-            </a:r>
-            <a:r>
-              <a:rPr lang="en-US" dirty="0" smtClean="0"/>
-              <a:t>-Orient</a:t>
+              <a:t>:	Object-Orient</a:t>
             </a:r>
           </a:p>
           <a:p>
@@ -6308,7 +8505,7 @@
                             </p:stCondLst>
                             <p:childTnLst>
                               <p:par>
-                                <p:cTn id="5" presetID="1" presetClass="entr" presetSubtype="0" fill="hold" nodeType="clickEffect">
+                                <p:cTn id="5" presetID="53" presetClass="entr" presetSubtype="16" fill="hold" nodeType="clickEffect">
                                   <p:stCondLst>
                                     <p:cond delay="0"/>
                                   </p:stCondLst>
@@ -6331,6 +8528,60 @@
                                         <p:strVal val="visible"/>
                                       </p:to>
                                     </p:set>
+                                    <p:anim calcmode="lin" valueType="num">
+                                      <p:cBhvr>
+                                        <p:cTn id="7" dur="500" fill="hold"/>
+                                        <p:tgtEl>
+                                          <p:spTgt spid="5"/>
+                                        </p:tgtEl>
+                                        <p:attrNameLst>
+                                          <p:attrName>ppt_w</p:attrName>
+                                        </p:attrNameLst>
+                                      </p:cBhvr>
+                                      <p:tavLst>
+                                        <p:tav tm="0">
+                                          <p:val>
+                                            <p:fltVal val="0"/>
+                                          </p:val>
+                                        </p:tav>
+                                        <p:tav tm="100000">
+                                          <p:val>
+                                            <p:strVal val="#ppt_w"/>
+                                          </p:val>
+                                        </p:tav>
+                                      </p:tavLst>
+                                    </p:anim>
+                                    <p:anim calcmode="lin" valueType="num">
+                                      <p:cBhvr>
+                                        <p:cTn id="8" dur="500" fill="hold"/>
+                                        <p:tgtEl>
+                                          <p:spTgt spid="5"/>
+                                        </p:tgtEl>
+                                        <p:attrNameLst>
+                                          <p:attrName>ppt_h</p:attrName>
+                                        </p:attrNameLst>
+                                      </p:cBhvr>
+                                      <p:tavLst>
+                                        <p:tav tm="0">
+                                          <p:val>
+                                            <p:fltVal val="0"/>
+                                          </p:val>
+                                        </p:tav>
+                                        <p:tav tm="100000">
+                                          <p:val>
+                                            <p:strVal val="#ppt_h"/>
+                                          </p:val>
+                                        </p:tav>
+                                      </p:tavLst>
+                                    </p:anim>
+                                    <p:animEffect transition="in" filter="fade">
+                                      <p:cBhvr>
+                                        <p:cTn id="9" dur="500"/>
+                                        <p:tgtEl>
+                                          <p:spTgt spid="5"/>
+                                        </p:tgtEl>
+                                      </p:cBhvr>
+                                    </p:animEffect>
                                   </p:childTnLst>
                                 </p:cTn>
                               </p:par>
@@ -6341,26 +8592,26 @@
                     </p:cTn>
                   </p:par>
                   <p:par>
-                    <p:cTn id="7" fill="hold">
+                    <p:cTn id="10" fill="hold">
                       <p:stCondLst>
                         <p:cond delay="indefinite"/>
                       </p:stCondLst>
                       <p:childTnLst>
                         <p:par>
-                          <p:cTn id="8" fill="hold">
+                          <p:cTn id="11" fill="hold">
                             <p:stCondLst>
                               <p:cond delay="0"/>
                             </p:stCondLst>
                             <p:childTnLst>
                               <p:par>
-                                <p:cTn id="9" presetID="5" presetClass="entr" presetSubtype="10" fill="hold" nodeType="clickEffect">
+                                <p:cTn id="12" presetID="53" presetClass="entr" presetSubtype="16" fill="hold" nodeType="clickEffect">
                                   <p:stCondLst>
                                     <p:cond delay="0"/>
                                   </p:stCondLst>
                                   <p:childTnLst>
                                     <p:set>
                                       <p:cBhvr>
-                                        <p:cTn id="10" dur="1" fill="hold">
+                                        <p:cTn id="13" dur="1" fill="hold">
                                           <p:stCondLst>
                                             <p:cond delay="0"/>
                                           </p:stCondLst>
@@ -6376,9 +8627,55 @@
                                         <p:strVal val="visible"/>
                                       </p:to>
                                     </p:set>
-                                    <p:animEffect transition="in" filter="checkerboard(across)">
+                                    <p:anim calcmode="lin" valueType="num">
                                       <p:cBhvr>
-                                        <p:cTn id="11" dur="500"/>
+                                        <p:cTn id="14" dur="500" fill="hold"/>
+                                        <p:tgtEl>
+                                          <p:spTgt spid="6"/>
+                                        </p:tgtEl>
+                                        <p:attrNameLst>
+                                          <p:attrName>ppt_w</p:attrName>
+                                        </p:attrNameLst>
+                                      </p:cBhvr>
+                                      <p:tavLst>
+                                        <p:tav tm="0">
+                                          <p:val>
+                                            <p:fltVal val="0"/>
+                                          </p:val>
+                                        </p:tav>
+                                        <p:tav tm="100000">
+                                          <p:val>
+                                            <p:strVal val="#ppt_w"/>
+                                          </p:val>
+                                        </p:tav>
+                                      </p:tavLst>
+                                    </p:anim>
+                                    <p:anim calcmode="lin" valueType="num">
+                                      <p:cBhvr>
+                                        <p:cTn id="15" dur="500" fill="hold"/>
+                                        <p:tgtEl>
+                                          <p:spTgt spid="6"/>
+                                        </p:tgtEl>
+                                        <p:attrNameLst>
+                                          <p:attrName>ppt_h</p:attrName>
+                                        </p:attrNameLst>
+                                      </p:cBhvr>
+                                      <p:tavLst>
+                                        <p:tav tm="0">
+                                          <p:val>
+                                            <p:fltVal val="0"/>
+                                          </p:val>
+                                        </p:tav>
+                                        <p:tav tm="100000">
+                                          <p:val>
+                                            <p:strVal val="#ppt_h"/>
+                                          </p:val>
+                                        </p:tav>
+                                      </p:tavLst>
+                                    </p:anim>
+                                    <p:animEffect transition="in" filter="fade">
+                                      <p:cBhvr>
+                                        <p:cTn id="16" dur="500"/>
                                         <p:tgtEl>
                                           <p:spTgt spid="6"/>
                                         </p:tgtEl>
@@ -6394,26 +8691,26 @@
                     </p:cTn>
                   </p:par>
                   <p:par>
-                    <p:cTn id="12" fill="hold">
+                    <p:cTn id="17" fill="hold">
                       <p:stCondLst>
                         <p:cond delay="indefinite"/>
                       </p:stCondLst>
                       <p:childTnLst>
                         <p:par>
-                          <p:cTn id="13" fill="hold">
+                          <p:cTn id="18" fill="hold">
                             <p:stCondLst>
                               <p:cond delay="0"/>
                             </p:stCondLst>
                             <p:childTnLst>
                               <p:par>
-                                <p:cTn id="14" presetID="6" presetClass="entr" presetSubtype="16" fill="hold" nodeType="clickEffect">
+                                <p:cTn id="19" presetID="31" presetClass="entr" presetSubtype="0" fill="hold" nodeType="clickEffect">
                                   <p:stCondLst>
                                     <p:cond delay="0"/>
                                   </p:stCondLst>
                                   <p:childTnLst>
                                     <p:set>
                                       <p:cBhvr>
-                                        <p:cTn id="15" dur="1" fill="hold">
+                                        <p:cTn id="20" dur="1" fill="hold">
                                           <p:stCondLst>
                                             <p:cond delay="0"/>
                                           </p:stCondLst>
@@ -6429,9 +8726,78 @@
                                         <p:strVal val="visible"/>
                                       </p:to>
                                     </p:set>
-                                    <p:animEffect transition="in" filter="circle(in)">
+                                    <p:anim calcmode="lin" valueType="num">
                                       <p:cBhvr>
-                                        <p:cTn id="16" dur="2000"/>
+                                        <p:cTn id="21" dur="1000" fill="hold"/>
+                                        <p:tgtEl>
+                                          <p:spTgt spid="7"/>
+                                        </p:tgtEl>
+                                        <p:attrNameLst>
+                                          <p:attrName>ppt_w</p:attrName>
+                                        </p:attrNameLst>
+                                      </p:cBhvr>
+                                      <p:tavLst>
+                                        <p:tav tm="0">
+                                          <p:val>
+                                            <p:fltVal val="0"/>
+                                          </p:val>
+                                        </p:tav>
+                                        <p:tav tm="100000">
+                                          <p:val>
+                                            <p:strVal val="#ppt_w"/>
+                                          </p:val>
+                                        </p:tav>
+                                      </p:tavLst>
+                                    </p:anim>
+                                    <p:anim calcmode="lin" valueType="num">
+                                      <p:cBhvr>
+                                        <p:cTn id="22" dur="1000" fill="hold"/>
+                                        <p:tgtEl>
+                                          <p:spTgt spid="7"/>
+                                        </p:tgtEl>
+                                        <p:attrNameLst>
+                                          <p:attrName>ppt_h</p:attrName>
+                                        </p:attrNameLst>
+                                      </p:cBhvr>
+                                      <p:tavLst>
+                                        <p:tav tm="0">
+                                          <p:val>
+                                            <p:fltVal val="0"/>
+                                          </p:val>
+                                        </p:tav>
+                                        <p:tav tm="100000">
+                                          <p:val>
+                                            <p:strVal val="#ppt_h"/>
+                                          </p:val>
+                                        </p:tav>
+                                      </p:tavLst>
+                                    </p:anim>
+                                    <p:anim calcmode="lin" valueType="num">
+                                      <p:cBhvr>
+                                        <p:cTn id="23" dur="1000" fill="hold"/>
+                                        <p:tgtEl>
+                                          <p:spTgt spid="7"/>
+                                        </p:tgtEl>
+                                        <p:attrNameLst>
+                                          <p:attrName>style.rotation</p:attrName>
+                                        </p:attrNameLst>
+                                      </p:cBhvr>
+                                      <p:tavLst>
+                                        <p:tav tm="0">
+                                          <p:val>
+                                            <p:fltVal val="90"/>
+                                          </p:val>
+                                        </p:tav>
+                                        <p:tav tm="100000">
+                                          <p:val>
+                                            <p:fltVal val="0"/>
+                                          </p:val>
+                                        </p:tav>
+                                      </p:tavLst>
+                                    </p:anim>
+                                    <p:animEffect transition="in" filter="fade">
+                                      <p:cBhvr>
+                                        <p:cTn id="24" dur="1000"/>
                                         <p:tgtEl>
                                           <p:spTgt spid="7"/>
                                         </p:tgtEl>
@@ -6506,7 +8872,7 @@
         </p:spPr>
         <p:txBody>
           <a:bodyPr>
-            <a:normAutofit lnSpcReduction="10000"/>
+            <a:normAutofit/>
           </a:bodyPr>
           <a:lstStyle/>
           <a:p>
@@ -6594,24 +8960,6 @@
               <a:buNone/>
             </a:pPr>
             <a:endParaRPr lang="en-US" dirty="0"/>
-          </a:p>
-          <a:p>
-            <a:pPr marL="36576" indent="0">
-              <a:buNone/>
-            </a:pPr>
-            <a:r>
-              <a:rPr lang="it-IT" dirty="0" smtClean="0"/>
-              <a:t>Il </a:t>
-            </a:r>
-            <a:r>
-              <a:rPr lang="it-IT" dirty="0"/>
-              <a:t>difetto è che questa può dipendere da fattori esterni quale per esempio la velocità del processore del </a:t>
-            </a:r>
-            <a:r>
-              <a:rPr lang="it-IT" dirty="0" smtClean="0"/>
-              <a:t>computer e/o le memorie a disposizione. </a:t>
-            </a:r>
-            <a:endParaRPr lang="it-IT" dirty="0"/>
           </a:p>
         </p:txBody>
       </p:sp>
@@ -6637,7 +8985,7 @@
         </p:blipFill>
         <p:spPr>
           <a:xfrm>
-            <a:off x="457201" y="3122195"/>
+            <a:off x="457201" y="3309353"/>
             <a:ext cx="8218904" cy="1409700"/>
           </a:xfrm>
           <a:prstGeom prst="rect">
@@ -6645,6 +8993,38 @@
           </a:prstGeom>
         </p:spPr>
       </p:pic>
+      <p:sp>
+        <p:nvSpPr>
+          <p:cNvPr id="2" name="TextBox 1"/>
+          <p:cNvSpPr txBox="1"/>
+          <p:nvPr/>
+        </p:nvSpPr>
+        <p:spPr>
+          <a:xfrm>
+            <a:off x="457199" y="4719053"/>
+            <a:ext cx="8218906" cy="2215991"/>
+          </a:xfrm>
+          <a:prstGeom prst="rect">
+            <a:avLst/>
+          </a:prstGeom>
+          <a:noFill/>
+        </p:spPr>
+        <p:txBody>
+          <a:bodyPr wrap="square" rtlCol="0">
+            <a:spAutoFit/>
+          </a:bodyPr>
+          <a:lstStyle/>
+          <a:p>
+            <a:r>
+              <a:rPr lang="it-IT" sz="3000" dirty="0"/>
+              <a:t>Il difetto è che questa può dipendere da fattori esterni quale per esempio la velocità del processore del computer e/o le memorie a disposizione. </a:t>
+            </a:r>
+          </a:p>
+          <a:p>
+            <a:endParaRPr lang="en-US" dirty="0"/>
+          </a:p>
+        </p:txBody>
+      </p:sp>
     </p:spTree>
     <p:extLst>
       <p:ext uri="{BB962C8B-B14F-4D97-AF65-F5344CB8AC3E}">
@@ -6658,9 +9038,134 @@
   <p:timing>
     <p:tnLst>
       <p:par>
-        <p:cTn xmlns:p14="http://schemas.microsoft.com/office/powerpoint/2010/main" id="1" dur="indefinite" restart="never" nodeType="tmRoot"/>
+        <p:cTn xmlns:p14="http://schemas.microsoft.com/office/powerpoint/2010/main" id="1" dur="indefinite" restart="never" nodeType="tmRoot">
+          <p:childTnLst>
+            <p:seq concurrent="1" nextAc="seek">
+              <p:cTn id="2" dur="indefinite" nodeType="mainSeq">
+                <p:childTnLst>
+                  <p:par>
+                    <p:cTn id="3" fill="hold">
+                      <p:stCondLst>
+                        <p:cond delay="indefinite"/>
+                      </p:stCondLst>
+                      <p:childTnLst>
+                        <p:par>
+                          <p:cTn id="4" fill="hold">
+                            <p:stCondLst>
+                              <p:cond delay="0"/>
+                            </p:stCondLst>
+                            <p:childTnLst>
+                              <p:par>
+                                <p:cTn id="5" presetID="42" presetClass="entr" presetSubtype="0" fill="hold" grpId="0" nodeType="clickEffect">
+                                  <p:stCondLst>
+                                    <p:cond delay="0"/>
+                                  </p:stCondLst>
+                                  <p:childTnLst>
+                                    <p:set>
+                                      <p:cBhvr>
+                                        <p:cTn id="6" dur="1" fill="hold">
+                                          <p:stCondLst>
+                                            <p:cond delay="0"/>
+                                          </p:stCondLst>
+                                        </p:cTn>
+                                        <p:tgtEl>
+                                          <p:spTgt spid="2"/>
+                                        </p:tgtEl>
+                                        <p:attrNameLst>
+                                          <p:attrName>style.visibility</p:attrName>
+                                        </p:attrNameLst>
+                                      </p:cBhvr>
+                                      <p:to>
+                                        <p:strVal val="visible"/>
+                                      </p:to>
+                                    </p:set>
+                                    <p:animEffect transition="in" filter="fade">
+                                      <p:cBhvr>
+                                        <p:cTn id="7" dur="1000"/>
+                                        <p:tgtEl>
+                                          <p:spTgt spid="2"/>
+                                        </p:tgtEl>
+                                      </p:cBhvr>
+                                    </p:animEffect>
+                                    <p:anim calcmode="lin" valueType="num">
+                                      <p:cBhvr>
+                                        <p:cTn id="8" dur="1000" fill="hold"/>
+                                        <p:tgtEl>
+                                          <p:spTgt spid="2"/>
+                                        </p:tgtEl>
+                                        <p:attrNameLst>
+                                          <p:attrName>ppt_x</p:attrName>
+                                        </p:attrNameLst>
+                                      </p:cBhvr>
+                                      <p:tavLst>
+                                        <p:tav tm="0">
+                                          <p:val>
+                                            <p:strVal val="#ppt_x"/>
+                                          </p:val>
+                                        </p:tav>
+                                        <p:tav tm="100000">
+                                          <p:val>
+                                            <p:strVal val="#ppt_x"/>
+                                          </p:val>
+                                        </p:tav>
+                                      </p:tavLst>
+                                    </p:anim>
+                                    <p:anim calcmode="lin" valueType="num">
+                                      <p:cBhvr>
+                                        <p:cTn id="9" dur="1000" fill="hold"/>
+                                        <p:tgtEl>
+                                          <p:spTgt spid="2"/>
+                                        </p:tgtEl>
+                                        <p:attrNameLst>
+                                          <p:attrName>ppt_y</p:attrName>
+                                        </p:attrNameLst>
+                                      </p:cBhvr>
+                                      <p:tavLst>
+                                        <p:tav tm="0">
+                                          <p:val>
+                                            <p:strVal val="#ppt_y+.1"/>
+                                          </p:val>
+                                        </p:tav>
+                                        <p:tav tm="100000">
+                                          <p:val>
+                                            <p:strVal val="#ppt_y"/>
+                                          </p:val>
+                                        </p:tav>
+                                      </p:tavLst>
+                                    </p:anim>
+                                  </p:childTnLst>
+                                </p:cTn>
+                              </p:par>
+                            </p:childTnLst>
+                          </p:cTn>
+                        </p:par>
+                      </p:childTnLst>
+                    </p:cTn>
+                  </p:par>
+                </p:childTnLst>
+              </p:cTn>
+              <p:prevCondLst>
+                <p:cond evt="onPrev" delay="0">
+                  <p:tgtEl>
+                    <p:sldTgt/>
+                  </p:tgtEl>
+                </p:cond>
+              </p:prevCondLst>
+              <p:nextCondLst>
+                <p:cond evt="onNext" delay="0">
+                  <p:tgtEl>
+                    <p:sldTgt/>
+                  </p:tgtEl>
+                </p:cond>
+              </p:nextCondLst>
+            </p:seq>
+          </p:childTnLst>
+        </p:cTn>
       </p:par>
     </p:tnLst>
+    <p:bldLst>
+      <p:bldP spid="2" grpId="0"/>
+    </p:bldLst>
   </p:timing>
 </p:sld>
 </file>

</xml_diff>

<commit_message>
Aggiornamento presentazione quasi ultimata-effetti
</commit_message>
<xml_diff>
--- a/Quesito 2 Team/1.ISW-Metrica.pptx
+++ b/Quesito 2 Team/1.ISW-Metrica.pptx
@@ -3551,7 +3551,17 @@
             </a:r>
             <a:r>
               <a:rPr lang="en-US" dirty="0" smtClean="0"/>
-              <a:t> 01</a:t>
+              <a:t> </a:t>
+            </a:r>
+            <a:r>
+              <a:rPr lang="en-US" dirty="0" smtClean="0"/>
+              <a:t>01</a:t>
+            </a:r>
+          </a:p>
+          <a:p>
+            <a:r>
+              <a:rPr lang="en-US" dirty="0" err="1" smtClean="0"/>
+              <a:t>TeamSoftwareRevolution</a:t>
             </a:r>
             <a:endParaRPr lang="en-US" dirty="0"/>
           </a:p>
@@ -4144,7 +4154,7 @@
         <p:spPr>
           <a:xfrm>
             <a:off x="457199" y="274638"/>
-            <a:ext cx="8259011" cy="6329362"/>
+            <a:ext cx="8259011" cy="4644941"/>
           </a:xfrm>
         </p:spPr>
         <p:txBody>
@@ -4225,13 +4235,6 @@
             <a:pPr marL="36576" indent="0">
               <a:buNone/>
             </a:pPr>
-            <a:r>
-              <a:rPr lang="it-IT" dirty="0" smtClean="0"/>
-              <a:t>Non tutti gli utenti possiedono le stesse conoscenze informatiche, capacità fisiche e logiche.</a:t>
-            </a:r>
-            <a:endParaRPr lang="it-IT" dirty="0"/>
-          </a:p>
-          <a:p>
             <a:endParaRPr lang="en-US" dirty="0"/>
           </a:p>
         </p:txBody>
@@ -4266,6 +4269,38 @@
           </a:prstGeom>
         </p:spPr>
       </p:pic>
+      <p:sp>
+        <p:nvSpPr>
+          <p:cNvPr id="2" name="TextBox 1"/>
+          <p:cNvSpPr txBox="1"/>
+          <p:nvPr/>
+        </p:nvSpPr>
+        <p:spPr>
+          <a:xfrm>
+            <a:off x="457198" y="4949364"/>
+            <a:ext cx="8259011" cy="1754327"/>
+          </a:xfrm>
+          <a:prstGeom prst="rect">
+            <a:avLst/>
+          </a:prstGeom>
+          <a:noFill/>
+        </p:spPr>
+        <p:txBody>
+          <a:bodyPr wrap="square" rtlCol="0">
+            <a:spAutoFit/>
+          </a:bodyPr>
+          <a:lstStyle/>
+          <a:p>
+            <a:r>
+              <a:rPr lang="it-IT" sz="3000" dirty="0"/>
+              <a:t>Non tutti gli utenti possiedono le stesse conoscenze informatiche, capacità fisiche e logiche.</a:t>
+            </a:r>
+          </a:p>
+          <a:p>
+            <a:endParaRPr lang="en-US" dirty="0"/>
+          </a:p>
+        </p:txBody>
+      </p:sp>
     </p:spTree>
     <p:extLst>
       <p:ext uri="{BB962C8B-B14F-4D97-AF65-F5344CB8AC3E}">
@@ -4279,9 +4314,133 @@
   <p:timing>
     <p:tnLst>
       <p:par>
-        <p:cTn xmlns:p14="http://schemas.microsoft.com/office/powerpoint/2010/main" id="1" dur="indefinite" restart="never" nodeType="tmRoot"/>
+        <p:cTn xmlns:p14="http://schemas.microsoft.com/office/powerpoint/2010/main" id="1" dur="indefinite" restart="never" nodeType="tmRoot">
+          <p:childTnLst>
+            <p:seq concurrent="1" nextAc="seek">
+              <p:cTn id="2" dur="indefinite" nodeType="mainSeq">
+                <p:childTnLst>
+                  <p:par>
+                    <p:cTn id="3" fill="hold">
+                      <p:stCondLst>
+                        <p:cond delay="indefinite"/>
+                      </p:stCondLst>
+                      <p:childTnLst>
+                        <p:par>
+                          <p:cTn id="4" fill="hold">
+                            <p:stCondLst>
+                              <p:cond delay="0"/>
+                            </p:stCondLst>
+                            <p:childTnLst>
+                              <p:par>
+                                <p:cTn id="5" presetID="1" presetClass="entr" presetSubtype="0" fill="hold" grpId="0" nodeType="clickEffect">
+                                  <p:stCondLst>
+                                    <p:cond delay="0"/>
+                                  </p:stCondLst>
+                                  <p:childTnLst>
+                                    <p:set>
+                                      <p:cBhvr>
+                                        <p:cTn id="6" dur="1" fill="hold">
+                                          <p:stCondLst>
+                                            <p:cond delay="0"/>
+                                          </p:stCondLst>
+                                        </p:cTn>
+                                        <p:tgtEl>
+                                          <p:spTgt spid="2"/>
+                                        </p:tgtEl>
+                                        <p:attrNameLst>
+                                          <p:attrName>style.visibility</p:attrName>
+                                        </p:attrNameLst>
+                                      </p:cBhvr>
+                                      <p:to>
+                                        <p:strVal val="visible"/>
+                                      </p:to>
+                                    </p:set>
+                                  </p:childTnLst>
+                                </p:cTn>
+                              </p:par>
+                            </p:childTnLst>
+                          </p:cTn>
+                        </p:par>
+                      </p:childTnLst>
+                    </p:cTn>
+                  </p:par>
+                  <p:par>
+                    <p:cTn id="7" fill="hold">
+                      <p:stCondLst>
+                        <p:cond delay="indefinite"/>
+                      </p:stCondLst>
+                      <p:childTnLst>
+                        <p:par>
+                          <p:cTn id="8" fill="hold">
+                            <p:stCondLst>
+                              <p:cond delay="0"/>
+                            </p:stCondLst>
+                            <p:childTnLst>
+                              <p:par>
+                                <p:cTn id="9" presetID="9" presetClass="entr" presetSubtype="0" fill="hold" nodeType="clickEffect">
+                                  <p:stCondLst>
+                                    <p:cond delay="0"/>
+                                  </p:stCondLst>
+                                  <p:childTnLst>
+                                    <p:set>
+                                      <p:cBhvr>
+                                        <p:cTn id="10" dur="1" fill="hold">
+                                          <p:stCondLst>
+                                            <p:cond delay="0"/>
+                                          </p:stCondLst>
+                                        </p:cTn>
+                                        <p:tgtEl>
+                                          <p:spTgt spid="4"/>
+                                        </p:tgtEl>
+                                        <p:attrNameLst>
+                                          <p:attrName>style.visibility</p:attrName>
+                                        </p:attrNameLst>
+                                      </p:cBhvr>
+                                      <p:to>
+                                        <p:strVal val="visible"/>
+                                      </p:to>
+                                    </p:set>
+                                    <p:animEffect transition="in" filter="dissolve">
+                                      <p:cBhvr>
+                                        <p:cTn id="11" dur="500"/>
+                                        <p:tgtEl>
+                                          <p:spTgt spid="4"/>
+                                        </p:tgtEl>
+                                      </p:cBhvr>
+                                    </p:animEffect>
+                                  </p:childTnLst>
+                                </p:cTn>
+                              </p:par>
+                            </p:childTnLst>
+                          </p:cTn>
+                        </p:par>
+                      </p:childTnLst>
+                    </p:cTn>
+                  </p:par>
+                </p:childTnLst>
+              </p:cTn>
+              <p:prevCondLst>
+                <p:cond evt="onPrev" delay="0">
+                  <p:tgtEl>
+                    <p:sldTgt/>
+                  </p:tgtEl>
+                </p:cond>
+              </p:prevCondLst>
+              <p:nextCondLst>
+                <p:cond evt="onNext" delay="0">
+                  <p:tgtEl>
+                    <p:sldTgt/>
+                  </p:tgtEl>
+                </p:cond>
+              </p:nextCondLst>
+            </p:seq>
+          </p:childTnLst>
+        </p:cTn>
       </p:par>
     </p:tnLst>
+    <p:bldLst>
+      <p:bldP spid="2" grpId="0"/>
+    </p:bldLst>
   </p:timing>
 </p:sld>
 </file>
@@ -4332,6 +4491,12 @@
             <a:pPr marL="36576" indent="0">
               <a:buNone/>
             </a:pPr>
+            <a:endParaRPr lang="it-IT" dirty="0" smtClean="0"/>
+          </a:p>
+          <a:p>
+            <a:pPr marL="36576" indent="0">
+              <a:buNone/>
+            </a:pPr>
             <a:r>
               <a:rPr lang="it-IT" dirty="0" smtClean="0"/>
               <a:t>Ogni </a:t>
@@ -4342,7 +4507,15 @@
             </a:r>
             <a:r>
               <a:rPr lang="it-IT" dirty="0"/>
-              <a:t>rappresenta una mancanza di valore e una opportunità per migliorarlo.</a:t>
+              <a:t>rappresenta una mancanza di valore e una </a:t>
+            </a:r>
+            <a:r>
+              <a:rPr lang="it-IT" b="1" u="sng" dirty="0">
+                <a:solidFill>
+                  <a:srgbClr val="FFFF00"/>
+                </a:solidFill>
+              </a:rPr>
+              <a:t>opportunità per migliorarlo.</a:t>
             </a:r>
           </a:p>
           <a:p>
@@ -4365,10 +4538,22 @@
             </a:r>
             <a:r>
               <a:rPr lang="it-IT" dirty="0"/>
-              <a:t> permette di affrontarli e </a:t>
-            </a:r>
-            <a:r>
-              <a:rPr lang="it-IT" dirty="0" smtClean="0"/>
+              <a:t> permette di </a:t>
+            </a:r>
+            <a:r>
+              <a:rPr lang="it-IT" u="sng" dirty="0">
+                <a:solidFill>
+                  <a:srgbClr val="FFFF00"/>
+                </a:solidFill>
+              </a:rPr>
+              <a:t>affrontarli e </a:t>
+            </a:r>
+            <a:r>
+              <a:rPr lang="it-IT" u="sng" dirty="0" smtClean="0">
+                <a:solidFill>
+                  <a:srgbClr val="FFFF00"/>
+                </a:solidFill>
+              </a:rPr>
               <a:t>risolverli.</a:t>
             </a:r>
           </a:p>
@@ -4444,30 +4629,58 @@
           <a:lstStyle/>
           <a:p>
             <a:r>
-              <a:rPr lang="en-US" dirty="0" err="1" smtClean="0"/>
+              <a:rPr lang="en-US" dirty="0" err="1" smtClean="0">
+                <a:solidFill>
+                  <a:srgbClr val="F79646"/>
+                </a:solidFill>
+              </a:rPr>
               <a:t>Classificazione</a:t>
             </a:r>
             <a:r>
-              <a:rPr lang="en-US" dirty="0" smtClean="0"/>
+              <a:rPr lang="en-US" dirty="0" smtClean="0">
+                <a:solidFill>
+                  <a:srgbClr val="F79646"/>
+                </a:solidFill>
+              </a:rPr>
               <a:t> </a:t>
             </a:r>
             <a:r>
-              <a:rPr lang="en-US" dirty="0" err="1" smtClean="0"/>
+              <a:rPr lang="en-US" dirty="0" err="1" smtClean="0">
+                <a:solidFill>
+                  <a:srgbClr val="F79646"/>
+                </a:solidFill>
+              </a:rPr>
               <a:t>degli</a:t>
             </a:r>
             <a:r>
-              <a:rPr lang="en-US" dirty="0" smtClean="0"/>
+              <a:rPr lang="en-US" dirty="0" smtClean="0">
+                <a:solidFill>
+                  <a:srgbClr val="F79646"/>
+                </a:solidFill>
+              </a:rPr>
               <a:t> </a:t>
             </a:r>
             <a:r>
-              <a:rPr lang="en-US" dirty="0" err="1" smtClean="0"/>
+              <a:rPr lang="en-US" dirty="0" err="1" smtClean="0">
+                <a:solidFill>
+                  <a:srgbClr val="F79646"/>
+                </a:solidFill>
+              </a:rPr>
               <a:t>errori</a:t>
             </a:r>
             <a:r>
-              <a:rPr lang="en-US" dirty="0" smtClean="0"/>
+              <a:rPr lang="en-US" dirty="0" smtClean="0">
+                <a:solidFill>
+                  <a:srgbClr val="F79646"/>
+                </a:solidFill>
+              </a:rPr>
               <a:t> SW</a:t>
             </a:r>
-            <a:endParaRPr lang="en-US" dirty="0"/>
+            <a:endParaRPr lang="en-US" dirty="0">
+              <a:solidFill>
+                <a:srgbClr val="F79646"/>
+              </a:solidFill>
+            </a:endParaRPr>
           </a:p>
         </p:txBody>
       </p:sp>
@@ -4772,7 +4985,11 @@
               <a:buNone/>
             </a:pPr>
             <a:r>
-              <a:rPr lang="it-IT" dirty="0" smtClean="0"/>
+              <a:rPr lang="it-IT" dirty="0" smtClean="0">
+                <a:solidFill>
+                  <a:schemeClr val="accent6"/>
+                </a:solidFill>
+              </a:rPr>
               <a:t>Tecniche per determinare la quantità di errori in un prodotto SW:</a:t>
             </a:r>
           </a:p>
@@ -4811,14 +5028,26 @@
               <a:t>tecnica che permette il rilevamento di questi bug è il </a:t>
             </a:r>
             <a:r>
-              <a:rPr lang="it-IT" b="1" dirty="0" err="1"/>
+              <a:rPr lang="it-IT" b="1" dirty="0" err="1">
+                <a:solidFill>
+                  <a:srgbClr val="FFFF00"/>
+                </a:solidFill>
+              </a:rPr>
               <a:t>Testing</a:t>
             </a:r>
             <a:r>
-              <a:rPr lang="it-IT" dirty="0"/>
+              <a:rPr lang="it-IT" dirty="0">
+                <a:solidFill>
+                  <a:srgbClr val="FFFF00"/>
+                </a:solidFill>
+              </a:rPr>
               <a:t>. </a:t>
             </a:r>
-            <a:endParaRPr lang="it-IT" dirty="0" smtClean="0"/>
+            <a:endParaRPr lang="it-IT" dirty="0" smtClean="0">
+              <a:solidFill>
+                <a:srgbClr val="FFFF00"/>
+              </a:solidFill>
+            </a:endParaRPr>
           </a:p>
           <a:p>
             <a:pPr marL="36576" indent="0">
@@ -4892,10 +5121,18 @@
           <a:lstStyle/>
           <a:p>
             <a:r>
-              <a:rPr lang="en-US" dirty="0" smtClean="0"/>
+              <a:rPr lang="en-US" dirty="0" smtClean="0">
+                <a:solidFill>
+                  <a:srgbClr val="F79646"/>
+                </a:solidFill>
+              </a:rPr>
               <a:t>Testing</a:t>
             </a:r>
-            <a:endParaRPr lang="en-US" dirty="0"/>
+            <a:endParaRPr lang="en-US" dirty="0">
+              <a:solidFill>
+                <a:srgbClr val="F79646"/>
+              </a:solidFill>
+            </a:endParaRPr>
           </a:p>
         </p:txBody>
       </p:sp>
@@ -5081,9 +5318,80 @@
   <p:timing>
     <p:tnLst>
       <p:par>
-        <p:cTn xmlns:p14="http://schemas.microsoft.com/office/powerpoint/2010/main" id="1" dur="indefinite" restart="never" nodeType="tmRoot"/>
+        <p:cTn xmlns:p14="http://schemas.microsoft.com/office/powerpoint/2010/main" id="1" dur="indefinite" restart="never" nodeType="tmRoot">
+          <p:childTnLst>
+            <p:seq concurrent="1" nextAc="seek">
+              <p:cTn id="2" dur="indefinite" nodeType="mainSeq">
+                <p:childTnLst>
+                  <p:par>
+                    <p:cTn id="3" fill="hold">
+                      <p:stCondLst>
+                        <p:cond delay="indefinite"/>
+                      </p:stCondLst>
+                      <p:childTnLst>
+                        <p:par>
+                          <p:cTn id="4" fill="hold">
+                            <p:stCondLst>
+                              <p:cond delay="0"/>
+                            </p:stCondLst>
+                            <p:childTnLst>
+                              <p:par>
+                                <p:cTn id="5" presetID="1" presetClass="entr" presetSubtype="0" fill="hold" grpId="0" nodeType="clickEffect">
+                                  <p:stCondLst>
+                                    <p:cond delay="0"/>
+                                  </p:stCondLst>
+                                  <p:childTnLst>
+                                    <p:set>
+                                      <p:cBhvr>
+                                        <p:cTn id="6" dur="1" fill="hold">
+                                          <p:stCondLst>
+                                            <p:cond delay="0"/>
+                                          </p:stCondLst>
+                                        </p:cTn>
+                                        <p:tgtEl>
+                                          <p:spTgt spid="4"/>
+                                        </p:tgtEl>
+                                        <p:attrNameLst>
+                                          <p:attrName>style.visibility</p:attrName>
+                                        </p:attrNameLst>
+                                      </p:cBhvr>
+                                      <p:to>
+                                        <p:strVal val="visible"/>
+                                      </p:to>
+                                    </p:set>
+                                  </p:childTnLst>
+                                </p:cTn>
+                              </p:par>
+                            </p:childTnLst>
+                          </p:cTn>
+                        </p:par>
+                      </p:childTnLst>
+                    </p:cTn>
+                  </p:par>
+                </p:childTnLst>
+              </p:cTn>
+              <p:prevCondLst>
+                <p:cond evt="onPrev" delay="0">
+                  <p:tgtEl>
+                    <p:sldTgt/>
+                  </p:tgtEl>
+                </p:cond>
+              </p:prevCondLst>
+              <p:nextCondLst>
+                <p:cond evt="onNext" delay="0">
+                  <p:tgtEl>
+                    <p:sldTgt/>
+                  </p:tgtEl>
+                </p:cond>
+              </p:nextCondLst>
+            </p:seq>
+          </p:childTnLst>
+        </p:cTn>
       </p:par>
     </p:tnLst>
+    <p:bldLst>
+      <p:bldP spid="4" grpId="0"/>
+    </p:bldLst>
   </p:timing>
 </p:sld>
 </file>
@@ -5130,7 +5438,7 @@
             <a:r>
               <a:rPr lang="en-US" sz="3000" dirty="0" smtClean="0">
                 <a:solidFill>
-                  <a:srgbClr val="FF0000"/>
+                  <a:srgbClr val="F79646"/>
                 </a:solidFill>
               </a:rPr>
               <a:t>L’ISW </a:t>
@@ -5138,7 +5446,7 @@
             <a:r>
               <a:rPr lang="en-US" sz="3000" dirty="0" err="1" smtClean="0">
                 <a:solidFill>
-                  <a:srgbClr val="FF0000"/>
+                  <a:srgbClr val="F79646"/>
                 </a:solidFill>
               </a:rPr>
               <a:t>è</a:t>
@@ -5146,7 +5454,7 @@
             <a:r>
               <a:rPr lang="en-US" sz="3000" dirty="0" smtClean="0">
                 <a:solidFill>
-                  <a:srgbClr val="FF0000"/>
+                  <a:srgbClr val="F79646"/>
                 </a:solidFill>
               </a:rPr>
               <a:t> </a:t>
@@ -5154,7 +5462,7 @@
             <a:r>
               <a:rPr lang="en-US" sz="3000" dirty="0" err="1" smtClean="0">
                 <a:solidFill>
-                  <a:srgbClr val="FF0000"/>
+                  <a:srgbClr val="F79646"/>
                 </a:solidFill>
               </a:rPr>
               <a:t>considerabile</a:t>
@@ -5162,7 +5470,7 @@
             <a:r>
               <a:rPr lang="en-US" sz="3000" dirty="0" smtClean="0">
                 <a:solidFill>
-                  <a:srgbClr val="FF0000"/>
+                  <a:srgbClr val="F79646"/>
                 </a:solidFill>
               </a:rPr>
               <a:t> </a:t>
@@ -5170,7 +5478,7 @@
             <a:r>
               <a:rPr lang="en-US" sz="3000" dirty="0" err="1" smtClean="0">
                 <a:solidFill>
-                  <a:srgbClr val="FF0000"/>
+                  <a:srgbClr val="F79646"/>
                 </a:solidFill>
               </a:rPr>
               <a:t>una</a:t>
@@ -5178,7 +5486,7 @@
             <a:r>
               <a:rPr lang="en-US" sz="3000" dirty="0" smtClean="0">
                 <a:solidFill>
-                  <a:srgbClr val="FF0000"/>
+                  <a:srgbClr val="F79646"/>
                 </a:solidFill>
               </a:rPr>
               <a:t> </a:t>
@@ -5186,7 +5494,7 @@
             <a:r>
               <a:rPr lang="en-US" sz="3000" dirty="0" err="1" smtClean="0">
                 <a:solidFill>
-                  <a:srgbClr val="FF0000"/>
+                  <a:srgbClr val="F79646"/>
                 </a:solidFill>
               </a:rPr>
               <a:t>disciplina</a:t>
@@ -5194,7 +5502,7 @@
             <a:r>
               <a:rPr lang="en-US" sz="3000" dirty="0" smtClean="0">
                 <a:solidFill>
-                  <a:srgbClr val="FF0000"/>
+                  <a:srgbClr val="F79646"/>
                 </a:solidFill>
               </a:rPr>
               <a:t> </a:t>
@@ -5202,7 +5510,7 @@
             <a:r>
               <a:rPr lang="en-US" sz="3000" dirty="0" err="1" smtClean="0">
                 <a:solidFill>
-                  <a:srgbClr val="FF0000"/>
+                  <a:srgbClr val="F79646"/>
                 </a:solidFill>
               </a:rPr>
               <a:t>scientifica</a:t>
@@ -5210,7 +5518,7 @@
             <a:r>
               <a:rPr lang="en-US" sz="3000" dirty="0" smtClean="0">
                 <a:solidFill>
-                  <a:srgbClr val="FF0000"/>
+                  <a:srgbClr val="F79646"/>
                 </a:solidFill>
               </a:rPr>
               <a:t> </a:t>
@@ -5218,7 +5526,7 @@
             <a:r>
               <a:rPr lang="en-US" sz="3000" dirty="0" err="1" smtClean="0">
                 <a:solidFill>
-                  <a:srgbClr val="FF0000"/>
+                  <a:srgbClr val="F79646"/>
                 </a:solidFill>
               </a:rPr>
               <a:t>esatta</a:t>
@@ -5226,14 +5534,14 @@
             <a:r>
               <a:rPr lang="en-US" sz="3000" dirty="0" smtClean="0">
                 <a:solidFill>
-                  <a:srgbClr val="FF0000"/>
+                  <a:srgbClr val="F79646"/>
                 </a:solidFill>
               </a:rPr>
               <a:t>?</a:t>
             </a:r>
             <a:endParaRPr lang="en-US" sz="3000" dirty="0">
               <a:solidFill>
-                <a:srgbClr val="FF0000"/>
+                <a:srgbClr val="F79646"/>
               </a:solidFill>
             </a:endParaRPr>
           </a:p>
@@ -5339,7 +5647,129 @@
   <p:timing>
     <p:tnLst>
       <p:par>
-        <p:cTn xmlns:p14="http://schemas.microsoft.com/office/powerpoint/2010/main" id="1" dur="indefinite" restart="never" nodeType="tmRoot"/>
+        <p:cTn xmlns:p14="http://schemas.microsoft.com/office/powerpoint/2010/main" id="1" dur="indefinite" restart="never" nodeType="tmRoot">
+          <p:childTnLst>
+            <p:seq concurrent="1" nextAc="seek">
+              <p:cTn id="2" dur="indefinite" nodeType="mainSeq">
+                <p:childTnLst>
+                  <p:par>
+                    <p:cTn id="3" fill="hold">
+                      <p:stCondLst>
+                        <p:cond delay="indefinite"/>
+                      </p:stCondLst>
+                      <p:childTnLst>
+                        <p:par>
+                          <p:cTn id="4" fill="hold">
+                            <p:stCondLst>
+                              <p:cond delay="0"/>
+                            </p:stCondLst>
+                            <p:childTnLst>
+                              <p:par>
+                                <p:cTn id="5" presetID="53" presetClass="entr" presetSubtype="16" fill="hold" nodeType="clickEffect">
+                                  <p:stCondLst>
+                                    <p:cond delay="0"/>
+                                  </p:stCondLst>
+                                  <p:childTnLst>
+                                    <p:set>
+                                      <p:cBhvr>
+                                        <p:cTn id="6" dur="1" fill="hold">
+                                          <p:stCondLst>
+                                            <p:cond delay="0"/>
+                                          </p:stCondLst>
+                                        </p:cTn>
+                                        <p:tgtEl>
+                                          <p:spTgt spid="12"/>
+                                        </p:tgtEl>
+                                        <p:attrNameLst>
+                                          <p:attrName>style.visibility</p:attrName>
+                                        </p:attrNameLst>
+                                      </p:cBhvr>
+                                      <p:to>
+                                        <p:strVal val="visible"/>
+                                      </p:to>
+                                    </p:set>
+                                    <p:anim calcmode="lin" valueType="num">
+                                      <p:cBhvr>
+                                        <p:cTn id="7" dur="500" fill="hold"/>
+                                        <p:tgtEl>
+                                          <p:spTgt spid="12"/>
+                                        </p:tgtEl>
+                                        <p:attrNameLst>
+                                          <p:attrName>ppt_w</p:attrName>
+                                        </p:attrNameLst>
+                                      </p:cBhvr>
+                                      <p:tavLst>
+                                        <p:tav tm="0">
+                                          <p:val>
+                                            <p:fltVal val="0"/>
+                                          </p:val>
+                                        </p:tav>
+                                        <p:tav tm="100000">
+                                          <p:val>
+                                            <p:strVal val="#ppt_w"/>
+                                          </p:val>
+                                        </p:tav>
+                                      </p:tavLst>
+                                    </p:anim>
+                                    <p:anim calcmode="lin" valueType="num">
+                                      <p:cBhvr>
+                                        <p:cTn id="8" dur="500" fill="hold"/>
+                                        <p:tgtEl>
+                                          <p:spTgt spid="12"/>
+                                        </p:tgtEl>
+                                        <p:attrNameLst>
+                                          <p:attrName>ppt_h</p:attrName>
+                                        </p:attrNameLst>
+                                      </p:cBhvr>
+                                      <p:tavLst>
+                                        <p:tav tm="0">
+                                          <p:val>
+                                            <p:fltVal val="0"/>
+                                          </p:val>
+                                        </p:tav>
+                                        <p:tav tm="100000">
+                                          <p:val>
+                                            <p:strVal val="#ppt_h"/>
+                                          </p:val>
+                                        </p:tav>
+                                      </p:tavLst>
+                                    </p:anim>
+                                    <p:animEffect transition="in" filter="fade">
+                                      <p:cBhvr>
+                                        <p:cTn id="9" dur="500"/>
+                                        <p:tgtEl>
+                                          <p:spTgt spid="12"/>
+                                        </p:tgtEl>
+                                      </p:cBhvr>
+                                    </p:animEffect>
+                                  </p:childTnLst>
+                                </p:cTn>
+                              </p:par>
+                            </p:childTnLst>
+                          </p:cTn>
+                        </p:par>
+                      </p:childTnLst>
+                    </p:cTn>
+                  </p:par>
+                </p:childTnLst>
+              </p:cTn>
+              <p:prevCondLst>
+                <p:cond evt="onPrev" delay="0">
+                  <p:tgtEl>
+                    <p:sldTgt/>
+                  </p:tgtEl>
+                </p:cond>
+              </p:prevCondLst>
+              <p:nextCondLst>
+                <p:cond evt="onNext" delay="0">
+                  <p:tgtEl>
+                    <p:sldTgt/>
+                  </p:tgtEl>
+                </p:cond>
+              </p:nextCondLst>
+            </p:seq>
+          </p:childTnLst>
+        </p:cTn>
       </p:par>
     </p:tnLst>
   </p:timing>
@@ -6156,30 +6586,58 @@
           <a:lstStyle/>
           <a:p>
             <a:r>
-              <a:rPr lang="en-US" dirty="0" err="1" smtClean="0"/>
+              <a:rPr lang="en-US" dirty="0" err="1" smtClean="0">
+                <a:solidFill>
+                  <a:srgbClr val="F79646"/>
+                </a:solidFill>
+              </a:rPr>
               <a:t>Cos’è</a:t>
             </a:r>
             <a:r>
-              <a:rPr lang="en-US" dirty="0" smtClean="0"/>
+              <a:rPr lang="en-US" dirty="0" smtClean="0">
+                <a:solidFill>
+                  <a:srgbClr val="F79646"/>
+                </a:solidFill>
+              </a:rPr>
               <a:t> </a:t>
             </a:r>
             <a:r>
-              <a:rPr lang="en-US" dirty="0" err="1" smtClean="0"/>
+              <a:rPr lang="en-US" dirty="0" err="1" smtClean="0">
+                <a:solidFill>
+                  <a:srgbClr val="F79646"/>
+                </a:solidFill>
+              </a:rPr>
               <a:t>una</a:t>
             </a:r>
             <a:r>
-              <a:rPr lang="en-US" dirty="0" smtClean="0"/>
+              <a:rPr lang="en-US" dirty="0" smtClean="0">
+                <a:solidFill>
+                  <a:srgbClr val="F79646"/>
+                </a:solidFill>
+              </a:rPr>
               <a:t> </a:t>
             </a:r>
             <a:r>
-              <a:rPr lang="en-US" dirty="0" err="1" smtClean="0"/>
+              <a:rPr lang="en-US" dirty="0" err="1" smtClean="0">
+                <a:solidFill>
+                  <a:srgbClr val="F79646"/>
+                </a:solidFill>
+              </a:rPr>
               <a:t>metrica</a:t>
             </a:r>
             <a:r>
-              <a:rPr lang="en-US" dirty="0" smtClean="0"/>
+              <a:rPr lang="en-US" dirty="0" smtClean="0">
+                <a:solidFill>
+                  <a:srgbClr val="F79646"/>
+                </a:solidFill>
+              </a:rPr>
               <a:t>?</a:t>
             </a:r>
-            <a:endParaRPr lang="en-US" dirty="0"/>
+            <a:endParaRPr lang="en-US" dirty="0">
+              <a:solidFill>
+                <a:srgbClr val="F79646"/>
+              </a:solidFill>
+            </a:endParaRPr>
           </a:p>
         </p:txBody>
       </p:sp>
@@ -6485,11 +6943,11 @@
   <p:clrMapOvr>
     <a:masterClrMapping/>
   </p:clrMapOvr>
-  <mc:AlternateContent xmlns:mc="http://schemas.openxmlformats.org/markup-compatibility/2006">
-    <mc:Choice xmlns:p14="http://schemas.microsoft.com/office/powerpoint/2010/main" Requires="p14">
+  <mc:AlternateContent xmlns:mc="http://schemas.openxmlformats.org/markup-compatibility/2006" xmlns:p14="http://schemas.microsoft.com/office/powerpoint/2010/main">
+    <mc:Choice Requires="p14">
       <p:transition p14:dur="0"/>
     </mc:Choice>
-    <mc:Fallback>
+    <mc:Fallback xmlns="">
       <p:transition xmlns:p14="http://schemas.microsoft.com/office/powerpoint/2010/main"/>
     </mc:Fallback>
   </mc:AlternateContent>
@@ -6914,34 +7372,66 @@
           <a:lstStyle/>
           <a:p>
             <a:r>
-              <a:rPr lang="en-US" dirty="0" smtClean="0"/>
+              <a:rPr lang="en-US" dirty="0" smtClean="0">
+                <a:solidFill>
+                  <a:srgbClr val="F79646"/>
+                </a:solidFill>
+              </a:rPr>
               <a:t>Di </a:t>
             </a:r>
             <a:r>
-              <a:rPr lang="en-US" dirty="0" err="1" smtClean="0"/>
+              <a:rPr lang="en-US" dirty="0" err="1" smtClean="0">
+                <a:solidFill>
+                  <a:srgbClr val="F79646"/>
+                </a:solidFill>
+              </a:rPr>
               <a:t>cosa</a:t>
             </a:r>
             <a:r>
-              <a:rPr lang="en-US" dirty="0" smtClean="0"/>
+              <a:rPr lang="en-US" dirty="0" smtClean="0">
+                <a:solidFill>
+                  <a:srgbClr val="F79646"/>
+                </a:solidFill>
+              </a:rPr>
               <a:t> </a:t>
             </a:r>
             <a:r>
-              <a:rPr lang="en-US" dirty="0" err="1" smtClean="0"/>
+              <a:rPr lang="en-US" dirty="0" err="1" smtClean="0">
+                <a:solidFill>
+                  <a:srgbClr val="F79646"/>
+                </a:solidFill>
+              </a:rPr>
               <a:t>stiamo</a:t>
             </a:r>
             <a:r>
-              <a:rPr lang="en-US" dirty="0" smtClean="0"/>
+              <a:rPr lang="en-US" dirty="0" smtClean="0">
+                <a:solidFill>
+                  <a:srgbClr val="F79646"/>
+                </a:solidFill>
+              </a:rPr>
               <a:t> </a:t>
             </a:r>
             <a:r>
-              <a:rPr lang="en-US" dirty="0" err="1" smtClean="0"/>
+              <a:rPr lang="en-US" dirty="0" err="1" smtClean="0">
+                <a:solidFill>
+                  <a:srgbClr val="F79646"/>
+                </a:solidFill>
+              </a:rPr>
               <a:t>parlando</a:t>
             </a:r>
             <a:r>
-              <a:rPr lang="en-US" dirty="0" smtClean="0"/>
+              <a:rPr lang="en-US" dirty="0" smtClean="0">
+                <a:solidFill>
+                  <a:srgbClr val="F79646"/>
+                </a:solidFill>
+              </a:rPr>
               <a:t>?</a:t>
             </a:r>
-            <a:endParaRPr lang="en-US" dirty="0"/>
+            <a:endParaRPr lang="en-US" dirty="0">
+              <a:solidFill>
+                <a:srgbClr val="F79646"/>
+              </a:solidFill>
+            </a:endParaRPr>
           </a:p>
         </p:txBody>
       </p:sp>
@@ -7314,31 +7804,59 @@
           <a:lstStyle/>
           <a:p>
             <a:r>
-              <a:rPr lang="en-US" dirty="0"/>
+              <a:rPr lang="en-US" dirty="0">
+                <a:solidFill>
+                  <a:srgbClr val="F79646"/>
+                </a:solidFill>
+              </a:rPr>
               <a:t>Di </a:t>
             </a:r>
             <a:r>
-              <a:rPr lang="en-US" dirty="0" err="1"/>
+              <a:rPr lang="en-US" dirty="0" err="1">
+                <a:solidFill>
+                  <a:srgbClr val="F79646"/>
+                </a:solidFill>
+              </a:rPr>
               <a:t>cosa</a:t>
             </a:r>
             <a:r>
-              <a:rPr lang="en-US" dirty="0"/>
+              <a:rPr lang="en-US" dirty="0">
+                <a:solidFill>
+                  <a:srgbClr val="F79646"/>
+                </a:solidFill>
+              </a:rPr>
               <a:t> </a:t>
             </a:r>
             <a:r>
-              <a:rPr lang="en-US" dirty="0" err="1"/>
+              <a:rPr lang="en-US" dirty="0" err="1">
+                <a:solidFill>
+                  <a:srgbClr val="F79646"/>
+                </a:solidFill>
+              </a:rPr>
               <a:t>stiamo</a:t>
             </a:r>
             <a:r>
-              <a:rPr lang="en-US" dirty="0"/>
+              <a:rPr lang="en-US" dirty="0">
+                <a:solidFill>
+                  <a:srgbClr val="F79646"/>
+                </a:solidFill>
+              </a:rPr>
               <a:t> </a:t>
             </a:r>
             <a:r>
-              <a:rPr lang="en-US" dirty="0" err="1"/>
+              <a:rPr lang="en-US" dirty="0" err="1">
+                <a:solidFill>
+                  <a:srgbClr val="F79646"/>
+                </a:solidFill>
+              </a:rPr>
               <a:t>parlando</a:t>
             </a:r>
             <a:r>
-              <a:rPr lang="en-US" dirty="0"/>
+              <a:rPr lang="en-US" dirty="0">
+                <a:solidFill>
+                  <a:srgbClr val="F79646"/>
+                </a:solidFill>
+              </a:rPr>
               <a:t>?</a:t>
             </a:r>
           </a:p>
@@ -8356,23 +8874,43 @@
               <a:buNone/>
             </a:pPr>
             <a:r>
-              <a:rPr lang="en-US" dirty="0" smtClean="0"/>
+              <a:rPr lang="en-US" dirty="0" smtClean="0">
+                <a:solidFill>
+                  <a:srgbClr val="F79646"/>
+                </a:solidFill>
+              </a:rPr>
               <a:t>Un </a:t>
             </a:r>
             <a:r>
-              <a:rPr lang="en-US" dirty="0" err="1" smtClean="0"/>
+              <a:rPr lang="en-US" dirty="0" err="1" smtClean="0">
+                <a:solidFill>
+                  <a:srgbClr val="F79646"/>
+                </a:solidFill>
+              </a:rPr>
               <a:t>altro</a:t>
             </a:r>
             <a:r>
-              <a:rPr lang="en-US" dirty="0" smtClean="0"/>
+              <a:rPr lang="en-US" dirty="0" smtClean="0">
+                <a:solidFill>
+                  <a:srgbClr val="F79646"/>
+                </a:solidFill>
+              </a:rPr>
               <a:t> </a:t>
             </a:r>
             <a:r>
-              <a:rPr lang="en-US" dirty="0" err="1" smtClean="0"/>
+              <a:rPr lang="en-US" dirty="0" err="1" smtClean="0">
+                <a:solidFill>
+                  <a:srgbClr val="F79646"/>
+                </a:solidFill>
+              </a:rPr>
               <a:t>esempio</a:t>
             </a:r>
             <a:r>
-              <a:rPr lang="en-US" dirty="0" smtClean="0"/>
+              <a:rPr lang="en-US" dirty="0" smtClean="0">
+                <a:solidFill>
+                  <a:srgbClr val="F79646"/>
+                </a:solidFill>
+              </a:rPr>
               <a:t>:	Object-Orient</a:t>
             </a:r>
           </a:p>
@@ -8880,15 +9418,27 @@
               <a:buNone/>
             </a:pPr>
             <a:r>
-              <a:rPr lang="it-IT" dirty="0" smtClean="0"/>
+              <a:rPr lang="it-IT" dirty="0" smtClean="0">
+                <a:solidFill>
+                  <a:srgbClr val="F79646"/>
+                </a:solidFill>
+              </a:rPr>
               <a:t>Metriche per </a:t>
             </a:r>
             <a:r>
-              <a:rPr lang="it-IT" dirty="0"/>
+              <a:rPr lang="it-IT" dirty="0">
+                <a:solidFill>
+                  <a:srgbClr val="F79646"/>
+                </a:solidFill>
+              </a:rPr>
               <a:t>misurare la qualità del </a:t>
             </a:r>
             <a:r>
-              <a:rPr lang="it-IT" dirty="0" smtClean="0"/>
+              <a:rPr lang="it-IT" dirty="0" smtClean="0">
+                <a:solidFill>
+                  <a:srgbClr val="F79646"/>
+                </a:solidFill>
+              </a:rPr>
               <a:t>software:</a:t>
             </a:r>
           </a:p>

</xml_diff>

<commit_message>
Quesito 1 - aggiornamento isw - metrica
</commit_message>
<xml_diff>
--- a/Quesito 2 Team/1.ISW-Metrica.pptx
+++ b/Quesito 2 Team/1.ISW-Metrica.pptx
@@ -3515,14 +3515,14 @@
           <a:p>
             <a:pPr algn="ctr"/>
             <a:r>
-              <a:rPr lang="en-US" sz="8000" i="1" dirty="0" err="1" smtClean="0"/>
+              <a:rPr lang="en-US" sz="9600" i="1" dirty="0" err="1" smtClean="0"/>
               <a:t>Metrica</a:t>
             </a:r>
             <a:r>
-              <a:rPr lang="en-US" sz="8000" i="1" dirty="0" smtClean="0"/>
+              <a:rPr lang="en-US" sz="9600" i="1" dirty="0" smtClean="0"/>
               <a:t>  </a:t>
             </a:r>
-            <a:endParaRPr lang="en-US" sz="8000" i="1" dirty="0"/>
+            <a:endParaRPr lang="en-US" sz="9600" i="1" dirty="0"/>
           </a:p>
         </p:txBody>
       </p:sp>
@@ -3551,11 +3551,7 @@
             </a:r>
             <a:r>
               <a:rPr lang="en-US" dirty="0" smtClean="0"/>
-              <a:t> </a:t>
-            </a:r>
-            <a:r>
-              <a:rPr lang="en-US" dirty="0" smtClean="0"/>
-              <a:t>01</a:t>
+              <a:t> 01</a:t>
             </a:r>
           </a:p>
           <a:p>
@@ -4905,21 +4901,6 @@
             </a:r>
             <a:endParaRPr lang="en-US" dirty="0" smtClean="0"/>
           </a:p>
-          <a:p>
-            <a:r>
-              <a:rPr lang="en-US" dirty="0" err="1" smtClean="0"/>
-              <a:t>Errori</a:t>
-            </a:r>
-            <a:r>
-              <a:rPr lang="en-US" dirty="0" smtClean="0"/>
-              <a:t> di </a:t>
-            </a:r>
-            <a:r>
-              <a:rPr lang="en-US" dirty="0" err="1" smtClean="0"/>
-              <a:t>codifica</a:t>
-            </a:r>
-            <a:endParaRPr lang="en-US" dirty="0" smtClean="0"/>
-          </a:p>
         </p:txBody>
       </p:sp>
     </p:spTree>
@@ -5606,7 +5587,7 @@
       </p:sp>
       <p:pic>
         <p:nvPicPr>
-          <p:cNvPr id="12" name="Picture 11" descr="Senza-titolo-4.jpg"/>
+          <p:cNvPr id="2" name="Picture 1" descr="Il_caso_e_chiuso.jpg"/>
           <p:cNvPicPr>
             <a:picLocks noChangeAspect="1"/>
           </p:cNvPicPr>
@@ -5626,8 +5607,8 @@
         </p:blipFill>
         <p:spPr>
           <a:xfrm>
-            <a:off x="2084440" y="1494451"/>
-            <a:ext cx="4974742" cy="2978607"/>
+            <a:off x="1550737" y="1567782"/>
+            <a:ext cx="5109410" cy="3029618"/>
           </a:xfrm>
           <a:prstGeom prst="rect">
             <a:avLst/>
@@ -5678,7 +5659,7 @@
                                           </p:stCondLst>
                                         </p:cTn>
                                         <p:tgtEl>
-                                          <p:spTgt spid="12"/>
+                                          <p:spTgt spid="2"/>
                                         </p:tgtEl>
                                         <p:attrNameLst>
                                           <p:attrName>style.visibility</p:attrName>
@@ -5692,7 +5673,7 @@
                                       <p:cBhvr>
                                         <p:cTn id="7" dur="500" fill="hold"/>
                                         <p:tgtEl>
-                                          <p:spTgt spid="12"/>
+                                          <p:spTgt spid="2"/>
                                         </p:tgtEl>
                                         <p:attrNameLst>
                                           <p:attrName>ppt_w</p:attrName>
@@ -5715,7 +5696,7 @@
                                       <p:cBhvr>
                                         <p:cTn id="8" dur="500" fill="hold"/>
                                         <p:tgtEl>
-                                          <p:spTgt spid="12"/>
+                                          <p:spTgt spid="2"/>
                                         </p:tgtEl>
                                         <p:attrNameLst>
                                           <p:attrName>ppt_h</p:attrName>
@@ -5738,7 +5719,7 @@
                                       <p:cBhvr>
                                         <p:cTn id="9" dur="500"/>
                                         <p:tgtEl>
-                                          <p:spTgt spid="12"/>
+                                          <p:spTgt spid="2"/>
                                         </p:tgtEl>
                                       </p:cBhvr>
                                     </p:animEffect>
@@ -7951,16 +7932,6 @@
               <a:buNone/>
             </a:pPr>
             <a:endParaRPr lang="en-US" dirty="0"/>
-          </a:p>
-          <a:p>
-            <a:r>
-              <a:rPr lang="en-US" dirty="0" err="1" smtClean="0"/>
-              <a:t>Dimensioni</a:t>
-            </a:r>
-            <a:r>
-              <a:rPr lang="en-US" dirty="0" smtClean="0"/>
-              <a:t> </a:t>
-            </a:r>
           </a:p>
           <a:p>
             <a:r>

</xml_diff>

<commit_message>
paper quesito 2-update 2.0
</commit_message>
<xml_diff>
--- a/Quesito 2 Team/1.ISW-Metrica.pptx
+++ b/Quesito 2 Team/1.ISW-Metrica.pptx
@@ -502,7 +502,7 @@
             <a:fld id="{E637BB6B-EE1B-48FB-8575-0D55C373DE88}" type="datetimeFigureOut">
               <a:rPr lang="en-US" smtClean="0"/>
               <a:pPr eaLnBrk="1" latinLnBrk="0" hangingPunct="1"/>
-              <a:t>16/03/16</a:t>
+              <a:t>18/03/16</a:t>
             </a:fld>
             <a:endParaRPr lang="en-US"/>
           </a:p>
@@ -650,7 +650,7 @@
             <a:fld id="{E637BB6B-EE1B-48FB-8575-0D55C373DE88}" type="datetimeFigureOut">
               <a:rPr lang="en-US" smtClean="0"/>
               <a:pPr eaLnBrk="1" latinLnBrk="0" hangingPunct="1"/>
-              <a:t>16/03/16</a:t>
+              <a:t>18/03/16</a:t>
             </a:fld>
             <a:endParaRPr lang="en-US" dirty="0"/>
           </a:p>
@@ -808,7 +808,7 @@
             <a:fld id="{E637BB6B-EE1B-48FB-8575-0D55C373DE88}" type="datetimeFigureOut">
               <a:rPr lang="en-US" smtClean="0"/>
               <a:pPr eaLnBrk="1" latinLnBrk="0" hangingPunct="1"/>
-              <a:t>16/03/16</a:t>
+              <a:t>18/03/16</a:t>
             </a:fld>
             <a:endParaRPr lang="en-US"/>
           </a:p>
@@ -960,7 +960,7 @@
             <a:fld id="{E637BB6B-EE1B-48FB-8575-0D55C373DE88}" type="datetimeFigureOut">
               <a:rPr lang="en-US" smtClean="0"/>
               <a:pPr eaLnBrk="1" latinLnBrk="0" hangingPunct="1"/>
-              <a:t>16/03/16</a:t>
+              <a:t>18/03/16</a:t>
             </a:fld>
             <a:endParaRPr lang="en-US"/>
           </a:p>
@@ -1411,7 +1411,7 @@
             <a:fld id="{E637BB6B-EE1B-48FB-8575-0D55C373DE88}" type="datetimeFigureOut">
               <a:rPr lang="en-US" smtClean="0"/>
               <a:pPr eaLnBrk="1" latinLnBrk="0" hangingPunct="1"/>
-              <a:t>16/03/16</a:t>
+              <a:t>18/03/16</a:t>
             </a:fld>
             <a:endParaRPr lang="en-US"/>
           </a:p>
@@ -1642,7 +1642,7 @@
             <a:fld id="{E637BB6B-EE1B-48FB-8575-0D55C373DE88}" type="datetimeFigureOut">
               <a:rPr lang="en-US" smtClean="0"/>
               <a:pPr eaLnBrk="1" latinLnBrk="0" hangingPunct="1"/>
-              <a:t>16/03/16</a:t>
+              <a:t>18/03/16</a:t>
             </a:fld>
             <a:endParaRPr lang="en-US"/>
           </a:p>
@@ -1977,7 +1977,7 @@
             <a:fld id="{E637BB6B-EE1B-48FB-8575-0D55C373DE88}" type="datetimeFigureOut">
               <a:rPr lang="en-US" smtClean="0"/>
               <a:pPr eaLnBrk="1" latinLnBrk="0" hangingPunct="1"/>
-              <a:t>16/03/16</a:t>
+              <a:t>18/03/16</a:t>
             </a:fld>
             <a:endParaRPr lang="en-US"/>
           </a:p>
@@ -2098,7 +2098,7 @@
             <a:fld id="{E637BB6B-EE1B-48FB-8575-0D55C373DE88}" type="datetimeFigureOut">
               <a:rPr lang="en-US" smtClean="0"/>
               <a:pPr eaLnBrk="1" latinLnBrk="0" hangingPunct="1"/>
-              <a:t>16/03/16</a:t>
+              <a:t>18/03/16</a:t>
             </a:fld>
             <a:endParaRPr lang="en-US"/>
           </a:p>
@@ -2191,7 +2191,7 @@
             <a:fld id="{E637BB6B-EE1B-48FB-8575-0D55C373DE88}" type="datetimeFigureOut">
               <a:rPr lang="en-US" smtClean="0"/>
               <a:pPr eaLnBrk="1" latinLnBrk="0" hangingPunct="1"/>
-              <a:t>16/03/16</a:t>
+              <a:t>18/03/16</a:t>
             </a:fld>
             <a:endParaRPr lang="en-US"/>
           </a:p>
@@ -2420,7 +2420,7 @@
             <a:fld id="{E637BB6B-EE1B-48FB-8575-0D55C373DE88}" type="datetimeFigureOut">
               <a:rPr lang="en-US" smtClean="0"/>
               <a:pPr eaLnBrk="1" latinLnBrk="0" hangingPunct="1"/>
-              <a:t>16/03/16</a:t>
+              <a:t>18/03/16</a:t>
             </a:fld>
             <a:endParaRPr lang="en-US"/>
           </a:p>
@@ -2671,7 +2671,7 @@
             <a:fld id="{E637BB6B-EE1B-48FB-8575-0D55C373DE88}" type="datetimeFigureOut">
               <a:rPr lang="en-US" smtClean="0"/>
               <a:pPr eaLnBrk="1" latinLnBrk="0" hangingPunct="1"/>
-              <a:t>16/03/16</a:t>
+              <a:t>18/03/16</a:t>
             </a:fld>
             <a:endParaRPr lang="en-US"/>
           </a:p>
@@ -3078,7 +3078,7 @@
             <a:fld id="{E637BB6B-EE1B-48FB-8575-0D55C373DE88}" type="datetimeFigureOut">
               <a:rPr lang="en-US" smtClean="0"/>
               <a:pPr eaLnBrk="1" latinLnBrk="0" hangingPunct="1"/>
-              <a:t>16/03/16</a:t>
+              <a:t>18/03/16</a:t>
             </a:fld>
             <a:endParaRPr lang="en-US" sz="1000">
               <a:solidFill>
@@ -5977,18 +5977,42 @@
             </a:r>
             <a:r>
               <a:rPr lang="it-IT" sz="3000" dirty="0"/>
-              <a:t>quali i fenomeni possono </a:t>
-            </a:r>
-            <a:endParaRPr lang="it-IT" sz="3000" dirty="0" smtClean="0"/>
-          </a:p>
-          <a:p>
+              <a:t>quali i </a:t>
+            </a:r>
             <a:r>
               <a:rPr lang="it-IT" sz="3000" dirty="0" smtClean="0"/>
-              <a:t>essere </a:t>
+              <a:t>comportamenti </a:t>
+            </a:r>
+            <a:endParaRPr lang="it-IT" sz="3000" dirty="0"/>
+          </a:p>
+          <a:p>
+            <a:r>
+              <a:rPr lang="en-US" sz="3000" dirty="0"/>
+              <a:t>p</a:t>
+            </a:r>
+            <a:r>
+              <a:rPr lang="it-IT" sz="3000" dirty="0" err="1" smtClean="0"/>
+              <a:t>ossono</a:t>
+            </a:r>
+            <a:r>
+              <a:rPr lang="it-IT" sz="3000" dirty="0" smtClean="0"/>
+              <a:t> essere </a:t>
             </a:r>
             <a:r>
               <a:rPr lang="it-IT" sz="3000" dirty="0"/>
-              <a:t>descritti attraverso un approccio empirico,  dove i risultati ottenuti si basano sull’osservazione dei fenomeni e non su teoremi. </a:t>
+              <a:t>descritti attraverso un approccio empirico,  dove i risultati ottenuti si basano </a:t>
+            </a:r>
+            <a:r>
+              <a:rPr lang="it-IT" sz="3000"/>
+              <a:t>sull’osservazione </a:t>
+            </a:r>
+            <a:r>
+              <a:rPr lang="it-IT" sz="3000" smtClean="0"/>
+              <a:t>e </a:t>
+            </a:r>
+            <a:r>
+              <a:rPr lang="it-IT" sz="3000" dirty="0"/>
+              <a:t>non su teoremi. </a:t>
             </a:r>
           </a:p>
           <a:p>

</xml_diff>